<commit_message>
PowerPoint Update and Notes
I have finished the first section of the PowerPoint, it is now only waiting for a GitHub screenshot and the Technical Questions to be answered. I also added a presentation speaker notes file.
</commit_message>
<xml_diff>
--- a/ELEC241 Practice Presentation.pptx
+++ b/ELEC241 Practice Presentation.pptx
@@ -18,23 +18,24 @@
     <p:sldId id="263" r:id="rId13"/>
     <p:sldId id="264" r:id="rId14"/>
     <p:sldId id="265" r:id="rId15"/>
+    <p:sldId id="266" r:id="rId16"/>
   </p:sldIdLst>
   <p:sldSz cy="5143500" cx="9144000"/>
   <p:notesSz cx="6858000" cy="9144000"/>
   <p:embeddedFontLst>
     <p:embeddedFont>
       <p:font typeface="Raleway"/>
-      <p:regular r:id="rId16"/>
-      <p:bold r:id="rId17"/>
-      <p:italic r:id="rId18"/>
-      <p:boldItalic r:id="rId19"/>
+      <p:regular r:id="rId17"/>
+      <p:bold r:id="rId18"/>
+      <p:italic r:id="rId19"/>
+      <p:boldItalic r:id="rId20"/>
     </p:embeddedFont>
     <p:embeddedFont>
       <p:font typeface="Lato"/>
-      <p:regular r:id="rId20"/>
-      <p:bold r:id="rId21"/>
-      <p:italic r:id="rId22"/>
-      <p:boldItalic r:id="rId23"/>
+      <p:regular r:id="rId21"/>
+      <p:bold r:id="rId22"/>
+      <p:italic r:id="rId23"/>
+      <p:boldItalic r:id="rId24"/>
     </p:embeddedFont>
   </p:embeddedFontLst>
   <p:defaultTextStyle>
@@ -829,7 +830,7 @@
       </p:grpSpPr>
       <p:sp>
         <p:nvSpPr>
-          <p:cNvPr id="136" name="Google Shape;136;gfbe2213694_0_196:notes"/>
+          <p:cNvPr id="136" name="Google Shape;136;gfbe2213694_0_201:notes"/>
           <p:cNvSpPr/>
           <p:nvPr>
             <p:ph idx="2" type="sldImg"/>
@@ -864,7 +865,106 @@
       </p:sp>
       <p:sp>
         <p:nvSpPr>
-          <p:cNvPr id="137" name="Google Shape;137;gfbe2213694_0_196:notes"/>
+          <p:cNvPr id="137" name="Google Shape;137;gfbe2213694_0_201:notes"/>
+          <p:cNvSpPr txBox="1"/>
+          <p:nvPr>
+            <p:ph idx="1" type="body"/>
+          </p:nvPr>
+        </p:nvSpPr>
+        <p:spPr>
+          <a:xfrm>
+            <a:off x="685800" y="4343400"/>
+            <a:ext cx="5486400" cy="4114800"/>
+          </a:xfrm>
+          <a:prstGeom prst="rect">
+            <a:avLst/>
+          </a:prstGeom>
+        </p:spPr>
+        <p:txBody>
+          <a:bodyPr anchorCtr="0" anchor="t" bIns="91425" lIns="91425" spcFirstLastPara="1" rIns="91425" wrap="square" tIns="91425">
+            <a:noAutofit/>
+          </a:bodyPr>
+          <a:lstStyle/>
+          <a:p>
+            <a:pPr indent="0" lvl="0" marL="0" rtl="0" algn="l">
+              <a:spcBef>
+                <a:spcPts val="0"/>
+              </a:spcBef>
+              <a:spcAft>
+                <a:spcPts val="0"/>
+              </a:spcAft>
+              <a:buNone/>
+            </a:pPr>
+            <a:r>
+              <a:t/>
+            </a:r>
+            <a:endParaRPr/>
+          </a:p>
+        </p:txBody>
+      </p:sp>
+    </p:spTree>
+  </p:cSld>
+  <p:clrMapOvr>
+    <a:masterClrMapping/>
+  </p:clrMapOvr>
+</p:notes>
+</file>
+
+<file path=ppt/notesSlides/notesSlide11.xml><?xml version="1.0" encoding="utf-8"?>
+<p:notes xmlns:a="http://schemas.openxmlformats.org/drawingml/2006/main" xmlns:r="http://schemas.openxmlformats.org/officeDocument/2006/relationships" xmlns:mc="http://schemas.openxmlformats.org/markup-compatibility/2006" xmlns:mv="urn:schemas-microsoft-com:mac:vml" xmlns:p="http://schemas.openxmlformats.org/presentationml/2006/main" xmlns:c="http://schemas.openxmlformats.org/drawingml/2006/chart" xmlns:dgm="http://schemas.openxmlformats.org/drawingml/2006/diagram" xmlns:o="urn:schemas-microsoft-com:office:office" xmlns:v="urn:schemas-microsoft-com:vml" xmlns:pvml="urn:schemas-microsoft-com:office:powerpoint" xmlns:com="http://schemas.openxmlformats.org/drawingml/2006/compatibility" xmlns:p14="http://schemas.microsoft.com/office/powerpoint/2010/main" xmlns:p15="http://schemas.microsoft.com/office/powerpoint/2012/main" xmlns:ahyp="http://schemas.microsoft.com/office/drawing/2018/hyperlinkcolor" showMasterPhAnim="0" showMasterSp="0">
+  <p:cSld>
+    <p:spTree>
+      <p:nvGrpSpPr>
+        <p:cNvPr id="141" name="Shape 141"/>
+        <p:cNvGrpSpPr/>
+        <p:nvPr/>
+      </p:nvGrpSpPr>
+      <p:grpSpPr>
+        <a:xfrm>
+          <a:off x="0" y="0"/>
+          <a:ext cx="0" cy="0"/>
+          <a:chOff x="0" y="0"/>
+          <a:chExt cx="0" cy="0"/>
+        </a:xfrm>
+      </p:grpSpPr>
+      <p:sp>
+        <p:nvSpPr>
+          <p:cNvPr id="142" name="Google Shape;142;gfbe2213694_0_196:notes"/>
+          <p:cNvSpPr/>
+          <p:nvPr>
+            <p:ph idx="2" type="sldImg"/>
+          </p:nvPr>
+        </p:nvSpPr>
+        <p:spPr>
+          <a:xfrm>
+            <a:off x="381300" y="685800"/>
+            <a:ext cx="6096000" cy="3429000"/>
+          </a:xfrm>
+          <a:custGeom>
+            <a:rect b="b" l="l" r="r" t="t"/>
+            <a:pathLst>
+              <a:path extrusionOk="0" h="120000" w="120000">
+                <a:moveTo>
+                  <a:pt x="0" y="0"/>
+                </a:moveTo>
+                <a:lnTo>
+                  <a:pt x="120000" y="0"/>
+                </a:lnTo>
+                <a:lnTo>
+                  <a:pt x="120000" y="120000"/>
+                </a:lnTo>
+                <a:lnTo>
+                  <a:pt x="0" y="120000"/>
+                </a:lnTo>
+                <a:close/>
+              </a:path>
+            </a:pathLst>
+          </a:custGeom>
+        </p:spPr>
+      </p:sp>
+      <p:sp>
+        <p:nvSpPr>
+          <p:cNvPr id="143" name="Google Shape;143;gfbe2213694_0_196:notes"/>
           <p:cNvSpPr txBox="1"/>
           <p:nvPr>
             <p:ph idx="1" type="body"/>
@@ -1522,7 +1622,7 @@
       </p:grpSpPr>
       <p:sp>
         <p:nvSpPr>
-          <p:cNvPr id="124" name="Google Shape;124;gfbe2213694_0_92:notes"/>
+          <p:cNvPr id="124" name="Google Shape;124;gfbe2213694_0_215:notes"/>
           <p:cNvSpPr/>
           <p:nvPr>
             <p:ph idx="2" type="sldImg"/>
@@ -1557,7 +1657,7 @@
       </p:sp>
       <p:sp>
         <p:nvSpPr>
-          <p:cNvPr id="125" name="Google Shape;125;gfbe2213694_0_92:notes"/>
+          <p:cNvPr id="125" name="Google Shape;125;gfbe2213694_0_215:notes"/>
           <p:cNvSpPr txBox="1"/>
           <p:nvPr>
             <p:ph idx="1" type="body"/>
@@ -1621,7 +1721,7 @@
       </p:grpSpPr>
       <p:sp>
         <p:nvSpPr>
-          <p:cNvPr id="130" name="Google Shape;130;gfbe2213694_0_201:notes"/>
+          <p:cNvPr id="130" name="Google Shape;130;gfbe2213694_0_92:notes"/>
           <p:cNvSpPr/>
           <p:nvPr>
             <p:ph idx="2" type="sldImg"/>
@@ -1656,7 +1756,7 @@
       </p:sp>
       <p:sp>
         <p:nvSpPr>
-          <p:cNvPr id="131" name="Google Shape;131;gfbe2213694_0_201:notes"/>
+          <p:cNvPr id="131" name="Google Shape;131;gfbe2213694_0_92:notes"/>
           <p:cNvSpPr txBox="1"/>
           <p:nvPr>
             <p:ph idx="1" type="body"/>
@@ -8148,7 +8248,11 @@
             </a:pPr>
             <a:r>
               <a:rPr lang="en"/>
-              <a:t>Explanation of Topics (Assert Command)</a:t>
+              <a:t>Technical Questions</a:t>
+            </a:r>
+            <a:r>
+              <a:rPr lang="en"/>
+              <a:t> (Testbench Design)</a:t>
             </a:r>
             <a:endParaRPr/>
           </a:p>
@@ -8157,6 +8261,114 @@
       <p:sp>
         <p:nvSpPr>
           <p:cNvPr id="140" name="Google Shape;140;p22"/>
+          <p:cNvSpPr txBox="1"/>
+          <p:nvPr>
+            <p:ph idx="1" type="body"/>
+          </p:nvPr>
+        </p:nvSpPr>
+        <p:spPr>
+          <a:xfrm>
+            <a:off x="729450" y="1438675"/>
+            <a:ext cx="7688700" cy="2901300"/>
+          </a:xfrm>
+          <a:prstGeom prst="rect">
+            <a:avLst/>
+          </a:prstGeom>
+        </p:spPr>
+        <p:txBody>
+          <a:bodyPr anchorCtr="0" anchor="t" bIns="91425" lIns="91425" spcFirstLastPara="1" rIns="91425" wrap="square" tIns="91425">
+            <a:normAutofit/>
+          </a:bodyPr>
+          <a:lstStyle/>
+          <a:p>
+            <a:pPr indent="0" lvl="0" marL="0" rtl="0" algn="l">
+              <a:spcBef>
+                <a:spcPts val="0"/>
+              </a:spcBef>
+              <a:spcAft>
+                <a:spcPts val="1200"/>
+              </a:spcAft>
+              <a:buNone/>
+            </a:pPr>
+            <a:r>
+              <a:t/>
+            </a:r>
+            <a:endParaRPr/>
+          </a:p>
+        </p:txBody>
+      </p:sp>
+    </p:spTree>
+  </p:cSld>
+  <p:clrMapOvr>
+    <a:masterClrMapping/>
+  </p:clrMapOvr>
+</p:sld>
+</file>
+
+<file path=ppt/slides/slide11.xml><?xml version="1.0" encoding="utf-8"?>
+<p:sld xmlns:a="http://schemas.openxmlformats.org/drawingml/2006/main" xmlns:r="http://schemas.openxmlformats.org/officeDocument/2006/relationships" xmlns:mc="http://schemas.openxmlformats.org/markup-compatibility/2006" xmlns:mv="urn:schemas-microsoft-com:mac:vml" xmlns:p="http://schemas.openxmlformats.org/presentationml/2006/main" xmlns:c="http://schemas.openxmlformats.org/drawingml/2006/chart" xmlns:dgm="http://schemas.openxmlformats.org/drawingml/2006/diagram" xmlns:o="urn:schemas-microsoft-com:office:office" xmlns:v="urn:schemas-microsoft-com:vml" xmlns:pvml="urn:schemas-microsoft-com:office:powerpoint" xmlns:com="http://schemas.openxmlformats.org/drawingml/2006/compatibility" xmlns:p14="http://schemas.microsoft.com/office/powerpoint/2010/main" xmlns:p15="http://schemas.microsoft.com/office/powerpoint/2012/main" xmlns:ahyp="http://schemas.microsoft.com/office/drawing/2018/hyperlinkcolor">
+  <p:cSld>
+    <p:spTree>
+      <p:nvGrpSpPr>
+        <p:cNvPr id="144" name="Shape 144"/>
+        <p:cNvGrpSpPr/>
+        <p:nvPr/>
+      </p:nvGrpSpPr>
+      <p:grpSpPr>
+        <a:xfrm>
+          <a:off x="0" y="0"/>
+          <a:ext cx="0" cy="0"/>
+          <a:chOff x="0" y="0"/>
+          <a:chExt cx="0" cy="0"/>
+        </a:xfrm>
+      </p:grpSpPr>
+      <p:sp>
+        <p:nvSpPr>
+          <p:cNvPr id="145" name="Google Shape;145;p23"/>
+          <p:cNvSpPr txBox="1"/>
+          <p:nvPr>
+            <p:ph type="title"/>
+          </p:nvPr>
+        </p:nvSpPr>
+        <p:spPr>
+          <a:xfrm>
+            <a:off x="729450" y="575800"/>
+            <a:ext cx="7688700" cy="535200"/>
+          </a:xfrm>
+          <a:prstGeom prst="rect">
+            <a:avLst/>
+          </a:prstGeom>
+        </p:spPr>
+        <p:txBody>
+          <a:bodyPr anchorCtr="0" anchor="t" bIns="91425" lIns="91425" spcFirstLastPara="1" rIns="91425" wrap="square" tIns="91425">
+            <a:normAutofit fontScale="90000"/>
+          </a:bodyPr>
+          <a:lstStyle/>
+          <a:p>
+            <a:pPr indent="0" lvl="0" marL="0" rtl="0" algn="l">
+              <a:spcBef>
+                <a:spcPts val="0"/>
+              </a:spcBef>
+              <a:spcAft>
+                <a:spcPts val="0"/>
+              </a:spcAft>
+              <a:buNone/>
+            </a:pPr>
+            <a:r>
+              <a:rPr lang="en"/>
+              <a:t>Technical Questions </a:t>
+            </a:r>
+            <a:r>
+              <a:rPr lang="en"/>
+              <a:t>(Assert Command)</a:t>
+            </a:r>
+            <a:endParaRPr/>
+          </a:p>
+        </p:txBody>
+      </p:sp>
+      <p:sp>
+        <p:nvSpPr>
+          <p:cNvPr id="146" name="Google Shape;146;p23"/>
           <p:cNvSpPr txBox="1"/>
           <p:nvPr>
             <p:ph idx="1" type="body"/>
@@ -8957,9 +9169,210 @@
               <a:buNone/>
             </a:pPr>
             <a:r>
-              <a:t/>
+              <a:rPr lang="en" sz="1200"/>
+              <a:t>For my time management, I have used a tool known as a ‘Kanban Board’. This allows me to see the overview of the project, with tasks in various ‘bins’.  Mine are as follows: ‘To Do’, ‘In Progress’, ‘Stuck’ and ‘Done’. The benefits to this system are as follows:</a:t>
             </a:r>
-            <a:endParaRPr/>
+            <a:endParaRPr sz="1200"/>
+          </a:p>
+          <a:p>
+            <a:pPr indent="-304800" lvl="0" marL="457200" rtl="0" algn="l">
+              <a:lnSpc>
+                <a:spcPct val="100000"/>
+              </a:lnSpc>
+              <a:spcBef>
+                <a:spcPts val="1200"/>
+              </a:spcBef>
+              <a:spcAft>
+                <a:spcPts val="0"/>
+              </a:spcAft>
+              <a:buSzPts val="1200"/>
+              <a:buChar char="-"/>
+            </a:pPr>
+            <a:r>
+              <a:rPr lang="en" sz="1200"/>
+              <a:t>Brief overview </a:t>
+            </a:r>
+            <a:endParaRPr sz="1200"/>
+          </a:p>
+          <a:p>
+            <a:pPr indent="-304800" lvl="1" marL="914400" rtl="0" algn="l">
+              <a:lnSpc>
+                <a:spcPct val="100000"/>
+              </a:lnSpc>
+              <a:spcBef>
+                <a:spcPts val="0"/>
+              </a:spcBef>
+              <a:spcAft>
+                <a:spcPts val="0"/>
+              </a:spcAft>
+              <a:buSzPts val="1200"/>
+              <a:buChar char="-"/>
+            </a:pPr>
+            <a:r>
+              <a:rPr lang="en" sz="1200"/>
+              <a:t>No detail or searching for the meaning of a task</a:t>
+            </a:r>
+            <a:endParaRPr sz="1200"/>
+          </a:p>
+          <a:p>
+            <a:pPr indent="-304800" lvl="1" marL="914400" rtl="0" algn="l">
+              <a:lnSpc>
+                <a:spcPct val="100000"/>
+              </a:lnSpc>
+              <a:spcBef>
+                <a:spcPts val="0"/>
+              </a:spcBef>
+              <a:spcAft>
+                <a:spcPts val="0"/>
+              </a:spcAft>
+              <a:buSzPts val="1200"/>
+              <a:buChar char="-"/>
+            </a:pPr>
+            <a:r>
+              <a:rPr lang="en" sz="1200"/>
+              <a:t>Everything is visible at a glance </a:t>
+            </a:r>
+            <a:endParaRPr sz="1200"/>
+          </a:p>
+          <a:p>
+            <a:pPr indent="-304800" lvl="0" marL="457200" rtl="0" algn="l">
+              <a:lnSpc>
+                <a:spcPct val="100000"/>
+              </a:lnSpc>
+              <a:spcBef>
+                <a:spcPts val="0"/>
+              </a:spcBef>
+              <a:spcAft>
+                <a:spcPts val="0"/>
+              </a:spcAft>
+              <a:buSzPts val="1200"/>
+              <a:buChar char="-"/>
+            </a:pPr>
+            <a:r>
+              <a:rPr lang="en" sz="1200"/>
+              <a:t>Identify what areas need to be worked on and what is working well</a:t>
+            </a:r>
+            <a:endParaRPr sz="1200"/>
+          </a:p>
+          <a:p>
+            <a:pPr indent="-304800" lvl="1" marL="914400" rtl="0" algn="l">
+              <a:lnSpc>
+                <a:spcPct val="100000"/>
+              </a:lnSpc>
+              <a:spcBef>
+                <a:spcPts val="0"/>
+              </a:spcBef>
+              <a:spcAft>
+                <a:spcPts val="0"/>
+              </a:spcAft>
+              <a:buSzPts val="1200"/>
+              <a:buChar char="-"/>
+            </a:pPr>
+            <a:r>
+              <a:rPr lang="en" sz="1200"/>
+              <a:t>Strong and weak points</a:t>
+            </a:r>
+            <a:endParaRPr sz="1200"/>
+          </a:p>
+          <a:p>
+            <a:pPr indent="-304800" lvl="0" marL="457200" rtl="0" algn="l">
+              <a:lnSpc>
+                <a:spcPct val="100000"/>
+              </a:lnSpc>
+              <a:spcBef>
+                <a:spcPts val="0"/>
+              </a:spcBef>
+              <a:spcAft>
+                <a:spcPts val="0"/>
+              </a:spcAft>
+              <a:buSzPts val="1200"/>
+              <a:buChar char="-"/>
+            </a:pPr>
+            <a:r>
+              <a:rPr lang="en" sz="1200"/>
+              <a:t>What remains and what takes priority </a:t>
+            </a:r>
+            <a:endParaRPr sz="1200"/>
+          </a:p>
+          <a:p>
+            <a:pPr indent="-304800" lvl="1" marL="914400" rtl="0" algn="l">
+              <a:lnSpc>
+                <a:spcPct val="100000"/>
+              </a:lnSpc>
+              <a:spcBef>
+                <a:spcPts val="0"/>
+              </a:spcBef>
+              <a:spcAft>
+                <a:spcPts val="0"/>
+              </a:spcAft>
+              <a:buSzPts val="1200"/>
+              <a:buChar char="-"/>
+            </a:pPr>
+            <a:r>
+              <a:rPr lang="en" sz="1200"/>
+              <a:t>Big tasks over small</a:t>
+            </a:r>
+            <a:endParaRPr sz="1200"/>
+          </a:p>
+          <a:p>
+            <a:pPr indent="-304800" lvl="1" marL="914400" rtl="0" algn="l">
+              <a:lnSpc>
+                <a:spcPct val="100000"/>
+              </a:lnSpc>
+              <a:spcBef>
+                <a:spcPts val="0"/>
+              </a:spcBef>
+              <a:spcAft>
+                <a:spcPts val="0"/>
+              </a:spcAft>
+              <a:buSzPts val="1200"/>
+              <a:buChar char="-"/>
+            </a:pPr>
+            <a:r>
+              <a:rPr lang="en" sz="1200"/>
+              <a:t>What takes the longest?</a:t>
+            </a:r>
+            <a:endParaRPr sz="1200"/>
+          </a:p>
+          <a:p>
+            <a:pPr indent="-304800" lvl="0" marL="457200" rtl="0" algn="l">
+              <a:lnSpc>
+                <a:spcPct val="100000"/>
+              </a:lnSpc>
+              <a:spcBef>
+                <a:spcPts val="0"/>
+              </a:spcBef>
+              <a:spcAft>
+                <a:spcPts val="0"/>
+              </a:spcAft>
+              <a:buSzPts val="1200"/>
+              <a:buChar char="-"/>
+            </a:pPr>
+            <a:r>
+              <a:rPr lang="en" sz="1200"/>
+              <a:t>“Where to now?”</a:t>
+            </a:r>
+            <a:endParaRPr sz="1200"/>
+          </a:p>
+          <a:p>
+            <a:pPr indent="-304800" lvl="1" marL="914400" rtl="0" algn="l">
+              <a:lnSpc>
+                <a:spcPct val="100000"/>
+              </a:lnSpc>
+              <a:spcBef>
+                <a:spcPts val="0"/>
+              </a:spcBef>
+              <a:spcAft>
+                <a:spcPts val="0"/>
+              </a:spcAft>
+              <a:buSzPts val="1200"/>
+              <a:buChar char="-"/>
+            </a:pPr>
+            <a:r>
+              <a:rPr lang="en" sz="1200"/>
+              <a:t>Eliminates the ‘lost’ feeling when overwhelmed by many tasks/projects </a:t>
+            </a:r>
+            <a:endParaRPr sz="1200"/>
           </a:p>
           <a:p>
             <a:pPr indent="0" lvl="0" marL="0" rtl="0" algn="l">
@@ -9126,7 +9539,7 @@
               </a:rPr>
               <a:t>https://tinyurl.com/yna2puys</a:t>
             </a:r>
-            <a:endParaRPr/>
+            <a:endParaRPr sz="1200"/>
           </a:p>
           <a:p>
             <a:pPr indent="0" lvl="0" marL="0" rtl="0" algn="l">
@@ -9142,9 +9555,127 @@
               <a:buNone/>
             </a:pPr>
             <a:r>
+              <a:rPr lang="en" sz="1200"/>
+              <a:t>OneNote provides a much more detailed approach than the Kanban Board. Here I am able to discuss the project at length. I used a simple layout with the date as a title, and provided an insight into what I had done since the last update. I found OneNote to be:</a:t>
+            </a:r>
+            <a:endParaRPr sz="1200"/>
+          </a:p>
+          <a:p>
+            <a:pPr indent="-304800" lvl="0" marL="457200" rtl="0" algn="l">
+              <a:lnSpc>
+                <a:spcPct val="100000"/>
+              </a:lnSpc>
+              <a:spcBef>
+                <a:spcPts val="1200"/>
+              </a:spcBef>
+              <a:spcAft>
+                <a:spcPts val="0"/>
+              </a:spcAft>
+              <a:buSzPts val="1200"/>
+              <a:buChar char="-"/>
+            </a:pPr>
+            <a:r>
+              <a:rPr lang="en" sz="1200"/>
+              <a:t>More suited to big tasks</a:t>
+            </a:r>
+            <a:endParaRPr sz="1200"/>
+          </a:p>
+          <a:p>
+            <a:pPr indent="-304800" lvl="1" marL="914400" rtl="0" algn="l">
+              <a:lnSpc>
+                <a:spcPct val="100000"/>
+              </a:lnSpc>
+              <a:spcBef>
+                <a:spcPts val="0"/>
+              </a:spcBef>
+              <a:spcAft>
+                <a:spcPts val="0"/>
+              </a:spcAft>
+              <a:buSzPts val="1200"/>
+              <a:buChar char="-"/>
+            </a:pPr>
+            <a:r>
+              <a:rPr lang="en" sz="1200"/>
+              <a:t>Do not need a large entry for “I wrote a readme.txt file”</a:t>
+            </a:r>
+            <a:endParaRPr sz="1200"/>
+          </a:p>
+          <a:p>
+            <a:pPr indent="-304800" lvl="0" marL="457200" rtl="0" algn="l">
+              <a:lnSpc>
+                <a:spcPct val="100000"/>
+              </a:lnSpc>
+              <a:spcBef>
+                <a:spcPts val="0"/>
+              </a:spcBef>
+              <a:spcAft>
+                <a:spcPts val="0"/>
+              </a:spcAft>
+              <a:buSzPts val="1200"/>
+              <a:buChar char="-"/>
+            </a:pPr>
+            <a:r>
+              <a:rPr lang="en" sz="1200"/>
+              <a:t>Useful for telling myself where to go next</a:t>
+            </a:r>
+            <a:endParaRPr sz="1200"/>
+          </a:p>
+          <a:p>
+            <a:pPr indent="-304800" lvl="1" marL="914400" rtl="0" algn="l">
+              <a:lnSpc>
+                <a:spcPct val="100000"/>
+              </a:lnSpc>
+              <a:spcBef>
+                <a:spcPts val="0"/>
+              </a:spcBef>
+              <a:spcAft>
+                <a:spcPts val="0"/>
+              </a:spcAft>
+              <a:buSzPts val="1200"/>
+              <a:buChar char="-"/>
+            </a:pPr>
+            <a:r>
+              <a:rPr lang="en" sz="1200"/>
+              <a:t>This needs doing soon, this can wait a while, etc.</a:t>
+            </a:r>
+            <a:endParaRPr sz="1200"/>
+          </a:p>
+          <a:p>
+            <a:pPr indent="0" lvl="0" marL="0" rtl="0" algn="l">
+              <a:lnSpc>
+                <a:spcPct val="100000"/>
+              </a:lnSpc>
+              <a:spcBef>
+                <a:spcPts val="1200"/>
+              </a:spcBef>
+              <a:spcAft>
+                <a:spcPts val="0"/>
+              </a:spcAft>
+              <a:buNone/>
+            </a:pPr>
+            <a:r>
+              <a:rPr lang="en" sz="1200"/>
+              <a:t>I have also inserted screenshots of my Kanban Board every time I wrote an update. This was very useful for tracking the progress, instead of only seeing the Kanban in the current state. </a:t>
+            </a:r>
+            <a:endParaRPr sz="1200"/>
+          </a:p>
+          <a:p>
+            <a:pPr indent="0" lvl="0" marL="0" rtl="0" algn="l">
+              <a:lnSpc>
+                <a:spcPct val="100000"/>
+              </a:lnSpc>
+              <a:spcBef>
+                <a:spcPts val="1200"/>
+              </a:spcBef>
+              <a:spcAft>
+                <a:spcPts val="0"/>
+              </a:spcAft>
+              <a:buNone/>
+            </a:pPr>
+            <a:r>
               <a:t/>
             </a:r>
-            <a:endParaRPr/>
+            <a:endParaRPr sz="1200"/>
           </a:p>
           <a:p>
             <a:pPr indent="0" lvl="0" marL="0" rtl="0" algn="l">
@@ -9527,13 +10058,13 @@
           <p:cNvPr id="127" name="Google Shape;127;p20"/>
           <p:cNvSpPr txBox="1"/>
           <p:nvPr>
-            <p:ph type="title"/>
+            <p:ph idx="2" type="body"/>
           </p:nvPr>
         </p:nvSpPr>
         <p:spPr>
           <a:xfrm>
-            <a:off x="729450" y="575800"/>
-            <a:ext cx="7688700" cy="535200"/>
+            <a:off x="5174225" y="1352625"/>
+            <a:ext cx="3374400" cy="3025500"/>
           </a:xfrm>
           <a:prstGeom prst="rect">
             <a:avLst/>
@@ -9541,22 +10072,87 @@
         </p:spPr>
         <p:txBody>
           <a:bodyPr anchorCtr="0" anchor="t" bIns="91425" lIns="91425" spcFirstLastPara="1" rIns="91425" wrap="square" tIns="91425">
-            <a:normAutofit fontScale="90000"/>
+            <a:normAutofit/>
           </a:bodyPr>
           <a:lstStyle/>
           <a:p>
-            <a:pPr indent="0" lvl="0" marL="0" rtl="0" algn="l">
-              <a:spcBef>
-                <a:spcPts val="0"/>
-              </a:spcBef>
-              <a:spcAft>
-                <a:spcPts val="0"/>
-              </a:spcAft>
-              <a:buNone/>
+            <a:pPr indent="-311150" lvl="0" marL="457200" rtl="0" algn="l">
+              <a:spcBef>
+                <a:spcPts val="0"/>
+              </a:spcBef>
+              <a:spcAft>
+                <a:spcPts val="0"/>
+              </a:spcAft>
+              <a:buSzPts val="1300"/>
+              <a:buChar char="-"/>
             </a:pPr>
             <a:r>
               <a:rPr lang="en"/>
-              <a:t>Explanation of Topics (Signal vs Variable)</a:t>
+              <a:t>VHDL: Signals vs Variables </a:t>
+            </a:r>
+            <a:endParaRPr/>
+          </a:p>
+          <a:p>
+            <a:pPr indent="0" lvl="0" marL="0" rtl="0" algn="l">
+              <a:spcBef>
+                <a:spcPts val="1200"/>
+              </a:spcBef>
+              <a:spcAft>
+                <a:spcPts val="0"/>
+              </a:spcAft>
+              <a:buNone/>
+            </a:pPr>
+            <a:r>
+              <a:t/>
+            </a:r>
+            <a:endParaRPr/>
+          </a:p>
+          <a:p>
+            <a:pPr indent="-311150" lvl="0" marL="457200" rtl="0" algn="l">
+              <a:spcBef>
+                <a:spcPts val="1200"/>
+              </a:spcBef>
+              <a:spcAft>
+                <a:spcPts val="0"/>
+              </a:spcAft>
+              <a:buSzPts val="1300"/>
+              <a:buChar char="-"/>
+            </a:pPr>
+            <a:r>
+              <a:rPr lang="en"/>
+              <a:t>Testbench Design</a:t>
+            </a:r>
+            <a:endParaRPr/>
+          </a:p>
+          <a:p>
+            <a:pPr indent="0" lvl="0" marL="0" rtl="0" algn="l">
+              <a:spcBef>
+                <a:spcPts val="1200"/>
+              </a:spcBef>
+              <a:spcAft>
+                <a:spcPts val="0"/>
+              </a:spcAft>
+              <a:buNone/>
+            </a:pPr>
+            <a:r>
+              <a:t/>
+            </a:r>
+            <a:endParaRPr/>
+          </a:p>
+          <a:p>
+            <a:pPr indent="-311150" lvl="0" marL="457200" rtl="0" algn="l">
+              <a:spcBef>
+                <a:spcPts val="1200"/>
+              </a:spcBef>
+              <a:spcAft>
+                <a:spcPts val="0"/>
+              </a:spcAft>
+              <a:buSzPts val="1300"/>
+              <a:buChar char="-"/>
+            </a:pPr>
+            <a:r>
+              <a:rPr lang="en"/>
+              <a:t>Assert Command</a:t>
             </a:r>
             <a:endParaRPr/>
           </a:p>
@@ -9567,13 +10163,13 @@
           <p:cNvPr id="128" name="Google Shape;128;p20"/>
           <p:cNvSpPr txBox="1"/>
           <p:nvPr>
-            <p:ph idx="1" type="body"/>
+            <p:ph type="title"/>
           </p:nvPr>
         </p:nvSpPr>
         <p:spPr>
           <a:xfrm>
-            <a:off x="729450" y="1438675"/>
-            <a:ext cx="7688700" cy="2901300"/>
+            <a:off x="730000" y="1318650"/>
+            <a:ext cx="3300900" cy="1687200"/>
           </a:xfrm>
           <a:prstGeom prst="rect">
             <a:avLst/>
@@ -9590,12 +10186,13 @@
                 <a:spcPts val="0"/>
               </a:spcBef>
               <a:spcAft>
-                <a:spcPts val="1200"/>
+                <a:spcPts val="0"/>
               </a:spcAft>
               <a:buNone/>
             </a:pPr>
             <a:r>
-              <a:t/>
+              <a:rPr lang="en"/>
+              <a:t>Technical Questions on VHDL and Testbenches</a:t>
             </a:r>
             <a:endParaRPr/>
           </a:p>
@@ -9660,7 +10257,7 @@
             </a:pPr>
             <a:r>
               <a:rPr lang="en"/>
-              <a:t>Explanation of Topics (Testbench Creation)</a:t>
+              <a:t>Technical Questions (Signal vs Variable)</a:t>
             </a:r>
             <a:endParaRPr/>
           </a:p>

</xml_diff>

<commit_message>
PowerPoint and Notes Completed
I have finished the PowerPoint and speaker notes. I must remember to revise it before my viva or recording. I must also remember to attach the link to said recording in the PowerPoint.
</commit_message>
<xml_diff>
--- a/ELEC241 Practice Presentation.pptx
+++ b/ELEC241 Practice Presentation.pptx
@@ -18,24 +18,23 @@
     <p:sldId id="263" r:id="rId13"/>
     <p:sldId id="264" r:id="rId14"/>
     <p:sldId id="265" r:id="rId15"/>
-    <p:sldId id="266" r:id="rId16"/>
   </p:sldIdLst>
   <p:sldSz cy="5143500" cx="9144000"/>
   <p:notesSz cx="6858000" cy="9144000"/>
   <p:embeddedFontLst>
     <p:embeddedFont>
       <p:font typeface="Raleway"/>
-      <p:regular r:id="rId17"/>
-      <p:bold r:id="rId18"/>
-      <p:italic r:id="rId19"/>
-      <p:boldItalic r:id="rId20"/>
+      <p:regular r:id="rId16"/>
+      <p:bold r:id="rId17"/>
+      <p:italic r:id="rId18"/>
+      <p:boldItalic r:id="rId19"/>
     </p:embeddedFont>
     <p:embeddedFont>
       <p:font typeface="Lato"/>
-      <p:regular r:id="rId21"/>
-      <p:bold r:id="rId22"/>
-      <p:italic r:id="rId23"/>
-      <p:boldItalic r:id="rId24"/>
+      <p:regular r:id="rId20"/>
+      <p:bold r:id="rId21"/>
+      <p:italic r:id="rId22"/>
+      <p:boldItalic r:id="rId23"/>
     </p:embeddedFont>
   </p:embeddedFontLst>
   <p:defaultTextStyle>
@@ -816,7 +815,7 @@
   <p:cSld>
     <p:spTree>
       <p:nvGrpSpPr>
-        <p:cNvPr id="135" name="Shape 135"/>
+        <p:cNvPr id="137" name="Shape 137"/>
         <p:cNvGrpSpPr/>
         <p:nvPr/>
       </p:nvGrpSpPr>
@@ -830,7 +829,7 @@
       </p:grpSpPr>
       <p:sp>
         <p:nvSpPr>
-          <p:cNvPr id="136" name="Google Shape;136;gfbe2213694_0_201:notes"/>
+          <p:cNvPr id="138" name="Google Shape;138;gfbe2213694_0_196:notes"/>
           <p:cNvSpPr/>
           <p:nvPr>
             <p:ph idx="2" type="sldImg"/>
@@ -865,106 +864,7 @@
       </p:sp>
       <p:sp>
         <p:nvSpPr>
-          <p:cNvPr id="137" name="Google Shape;137;gfbe2213694_0_201:notes"/>
-          <p:cNvSpPr txBox="1"/>
-          <p:nvPr>
-            <p:ph idx="1" type="body"/>
-          </p:nvPr>
-        </p:nvSpPr>
-        <p:spPr>
-          <a:xfrm>
-            <a:off x="685800" y="4343400"/>
-            <a:ext cx="5486400" cy="4114800"/>
-          </a:xfrm>
-          <a:prstGeom prst="rect">
-            <a:avLst/>
-          </a:prstGeom>
-        </p:spPr>
-        <p:txBody>
-          <a:bodyPr anchorCtr="0" anchor="t" bIns="91425" lIns="91425" spcFirstLastPara="1" rIns="91425" wrap="square" tIns="91425">
-            <a:noAutofit/>
-          </a:bodyPr>
-          <a:lstStyle/>
-          <a:p>
-            <a:pPr indent="0" lvl="0" marL="0" rtl="0" algn="l">
-              <a:spcBef>
-                <a:spcPts val="0"/>
-              </a:spcBef>
-              <a:spcAft>
-                <a:spcPts val="0"/>
-              </a:spcAft>
-              <a:buNone/>
-            </a:pPr>
-            <a:r>
-              <a:t/>
-            </a:r>
-            <a:endParaRPr/>
-          </a:p>
-        </p:txBody>
-      </p:sp>
-    </p:spTree>
-  </p:cSld>
-  <p:clrMapOvr>
-    <a:masterClrMapping/>
-  </p:clrMapOvr>
-</p:notes>
-</file>
-
-<file path=ppt/notesSlides/notesSlide11.xml><?xml version="1.0" encoding="utf-8"?>
-<p:notes xmlns:a="http://schemas.openxmlformats.org/drawingml/2006/main" xmlns:r="http://schemas.openxmlformats.org/officeDocument/2006/relationships" xmlns:mc="http://schemas.openxmlformats.org/markup-compatibility/2006" xmlns:mv="urn:schemas-microsoft-com:mac:vml" xmlns:p="http://schemas.openxmlformats.org/presentationml/2006/main" xmlns:c="http://schemas.openxmlformats.org/drawingml/2006/chart" xmlns:dgm="http://schemas.openxmlformats.org/drawingml/2006/diagram" xmlns:o="urn:schemas-microsoft-com:office:office" xmlns:v="urn:schemas-microsoft-com:vml" xmlns:pvml="urn:schemas-microsoft-com:office:powerpoint" xmlns:com="http://schemas.openxmlformats.org/drawingml/2006/compatibility" xmlns:p14="http://schemas.microsoft.com/office/powerpoint/2010/main" xmlns:p15="http://schemas.microsoft.com/office/powerpoint/2012/main" xmlns:ahyp="http://schemas.microsoft.com/office/drawing/2018/hyperlinkcolor" showMasterPhAnim="0" showMasterSp="0">
-  <p:cSld>
-    <p:spTree>
-      <p:nvGrpSpPr>
-        <p:cNvPr id="141" name="Shape 141"/>
-        <p:cNvGrpSpPr/>
-        <p:nvPr/>
-      </p:nvGrpSpPr>
-      <p:grpSpPr>
-        <a:xfrm>
-          <a:off x="0" y="0"/>
-          <a:ext cx="0" cy="0"/>
-          <a:chOff x="0" y="0"/>
-          <a:chExt cx="0" cy="0"/>
-        </a:xfrm>
-      </p:grpSpPr>
-      <p:sp>
-        <p:nvSpPr>
-          <p:cNvPr id="142" name="Google Shape;142;gfbe2213694_0_196:notes"/>
-          <p:cNvSpPr/>
-          <p:nvPr>
-            <p:ph idx="2" type="sldImg"/>
-          </p:nvPr>
-        </p:nvSpPr>
-        <p:spPr>
-          <a:xfrm>
-            <a:off x="381300" y="685800"/>
-            <a:ext cx="6096000" cy="3429000"/>
-          </a:xfrm>
-          <a:custGeom>
-            <a:rect b="b" l="l" r="r" t="t"/>
-            <a:pathLst>
-              <a:path extrusionOk="0" h="120000" w="120000">
-                <a:moveTo>
-                  <a:pt x="0" y="0"/>
-                </a:moveTo>
-                <a:lnTo>
-                  <a:pt x="120000" y="0"/>
-                </a:lnTo>
-                <a:lnTo>
-                  <a:pt x="120000" y="120000"/>
-                </a:lnTo>
-                <a:lnTo>
-                  <a:pt x="0" y="120000"/>
-                </a:lnTo>
-                <a:close/>
-              </a:path>
-            </a:pathLst>
-          </a:custGeom>
-        </p:spPr>
-      </p:sp>
-      <p:sp>
-        <p:nvSpPr>
-          <p:cNvPr id="143" name="Google Shape;143;gfbe2213694_0_196:notes"/>
+          <p:cNvPr id="139" name="Google Shape;139;gfbe2213694_0_196:notes"/>
           <p:cNvSpPr txBox="1"/>
           <p:nvPr>
             <p:ph idx="1" type="body"/>
@@ -1523,7 +1423,7 @@
       </p:grpSpPr>
       <p:sp>
         <p:nvSpPr>
-          <p:cNvPr id="120" name="Google Shape;120;gfbe2213694_0_208:notes"/>
+          <p:cNvPr id="120" name="Google Shape;120;gfbe2213694_0_215:notes"/>
           <p:cNvSpPr/>
           <p:nvPr>
             <p:ph idx="2" type="sldImg"/>
@@ -1558,7 +1458,7 @@
       </p:sp>
       <p:sp>
         <p:nvSpPr>
-          <p:cNvPr id="121" name="Google Shape;121;gfbe2213694_0_208:notes"/>
+          <p:cNvPr id="121" name="Google Shape;121;gfbe2213694_0_215:notes"/>
           <p:cNvSpPr txBox="1"/>
           <p:nvPr>
             <p:ph idx="1" type="body"/>
@@ -1608,7 +1508,7 @@
   <p:cSld>
     <p:spTree>
       <p:nvGrpSpPr>
-        <p:cNvPr id="123" name="Shape 123"/>
+        <p:cNvPr id="125" name="Shape 125"/>
         <p:cNvGrpSpPr/>
         <p:nvPr/>
       </p:nvGrpSpPr>
@@ -1622,7 +1522,7 @@
       </p:grpSpPr>
       <p:sp>
         <p:nvSpPr>
-          <p:cNvPr id="124" name="Google Shape;124;gfbe2213694_0_215:notes"/>
+          <p:cNvPr id="126" name="Google Shape;126;gfbe2213694_0_92:notes"/>
           <p:cNvSpPr/>
           <p:nvPr>
             <p:ph idx="2" type="sldImg"/>
@@ -1657,7 +1557,7 @@
       </p:sp>
       <p:sp>
         <p:nvSpPr>
-          <p:cNvPr id="125" name="Google Shape;125;gfbe2213694_0_215:notes"/>
+          <p:cNvPr id="127" name="Google Shape;127;gfbe2213694_0_92:notes"/>
           <p:cNvSpPr txBox="1"/>
           <p:nvPr>
             <p:ph idx="1" type="body"/>
@@ -1707,7 +1607,7 @@
   <p:cSld>
     <p:spTree>
       <p:nvGrpSpPr>
-        <p:cNvPr id="129" name="Shape 129"/>
+        <p:cNvPr id="131" name="Shape 131"/>
         <p:cNvGrpSpPr/>
         <p:nvPr/>
       </p:nvGrpSpPr>
@@ -1721,7 +1621,7 @@
       </p:grpSpPr>
       <p:sp>
         <p:nvSpPr>
-          <p:cNvPr id="130" name="Google Shape;130;gfbe2213694_0_92:notes"/>
+          <p:cNvPr id="132" name="Google Shape;132;gfbe2213694_0_201:notes"/>
           <p:cNvSpPr/>
           <p:nvPr>
             <p:ph idx="2" type="sldImg"/>
@@ -1756,7 +1656,7 @@
       </p:sp>
       <p:sp>
         <p:nvSpPr>
-          <p:cNvPr id="131" name="Google Shape;131;gfbe2213694_0_92:notes"/>
+          <p:cNvPr id="133" name="Google Shape;133;gfbe2213694_0_201:notes"/>
           <p:cNvSpPr txBox="1"/>
           <p:nvPr>
             <p:ph idx="1" type="body"/>
@@ -8202,7 +8102,7 @@
   <p:cSld>
     <p:spTree>
       <p:nvGrpSpPr>
-        <p:cNvPr id="138" name="Shape 138"/>
+        <p:cNvPr id="140" name="Shape 140"/>
         <p:cNvGrpSpPr/>
         <p:nvPr/>
       </p:nvGrpSpPr>
@@ -8216,7 +8116,7 @@
       </p:grpSpPr>
       <p:sp>
         <p:nvSpPr>
-          <p:cNvPr id="139" name="Google Shape;139;p22"/>
+          <p:cNvPr id="141" name="Google Shape;141;p22"/>
           <p:cNvSpPr txBox="1"/>
           <p:nvPr>
             <p:ph type="title"/>
@@ -8248,11 +8148,11 @@
             </a:pPr>
             <a:r>
               <a:rPr lang="en"/>
-              <a:t>Technical Questions</a:t>
+              <a:t>Technical Questions </a:t>
             </a:r>
             <a:r>
               <a:rPr lang="en"/>
-              <a:t> (Testbench Design)</a:t>
+              <a:t>(Assert Command)</a:t>
             </a:r>
             <a:endParaRPr/>
           </a:p>
@@ -8260,7 +8160,7 @@
       </p:sp>
       <p:sp>
         <p:nvSpPr>
-          <p:cNvPr id="140" name="Google Shape;140;p22"/>
+          <p:cNvPr id="142" name="Google Shape;142;p22"/>
           <p:cNvSpPr txBox="1"/>
           <p:nvPr>
             <p:ph idx="1" type="body"/>
@@ -8269,7 +8169,7 @@
         <p:spPr>
           <a:xfrm>
             <a:off x="729450" y="1438675"/>
-            <a:ext cx="7688700" cy="2901300"/>
+            <a:ext cx="7688700" cy="3319200"/>
           </a:xfrm>
           <a:prstGeom prst="rect">
             <a:avLst/>
@@ -8277,7 +8177,7 @@
         </p:spPr>
         <p:txBody>
           <a:bodyPr anchorCtr="0" anchor="t" bIns="91425" lIns="91425" spcFirstLastPara="1" rIns="91425" wrap="square" tIns="91425">
-            <a:normAutofit/>
+            <a:noAutofit/>
           </a:bodyPr>
           <a:lstStyle/>
           <a:p>
@@ -8286,122 +8186,153 @@
                 <a:spcPts val="0"/>
               </a:spcBef>
               <a:spcAft>
+                <a:spcPts val="0"/>
+              </a:spcAft>
+              <a:buNone/>
+            </a:pPr>
+            <a:r>
+              <a:rPr lang="en" sz="1200"/>
+              <a:t>The ‘assert’ </a:t>
+            </a:r>
+            <a:r>
+              <a:rPr lang="en" sz="1200"/>
+              <a:t>command is used to automate a VHDL testbench. It is a way of checking certain conditions and giving an ‘error’ message if they are met. This ‘error’ has a severity level as follows:</a:t>
+            </a:r>
+            <a:endParaRPr sz="1200"/>
+          </a:p>
+          <a:p>
+            <a:pPr indent="-304800" lvl="0" marL="457200" rtl="0" algn="l">
+              <a:spcBef>
                 <a:spcPts val="1200"/>
-              </a:spcAft>
-              <a:buNone/>
-            </a:pPr>
-            <a:r>
-              <a:t/>
-            </a:r>
-            <a:endParaRPr/>
-          </a:p>
-        </p:txBody>
-      </p:sp>
-    </p:spTree>
-  </p:cSld>
-  <p:clrMapOvr>
-    <a:masterClrMapping/>
-  </p:clrMapOvr>
-</p:sld>
-</file>
-
-<file path=ppt/slides/slide11.xml><?xml version="1.0" encoding="utf-8"?>
-<p:sld xmlns:a="http://schemas.openxmlformats.org/drawingml/2006/main" xmlns:r="http://schemas.openxmlformats.org/officeDocument/2006/relationships" xmlns:mc="http://schemas.openxmlformats.org/markup-compatibility/2006" xmlns:mv="urn:schemas-microsoft-com:mac:vml" xmlns:p="http://schemas.openxmlformats.org/presentationml/2006/main" xmlns:c="http://schemas.openxmlformats.org/drawingml/2006/chart" xmlns:dgm="http://schemas.openxmlformats.org/drawingml/2006/diagram" xmlns:o="urn:schemas-microsoft-com:office:office" xmlns:v="urn:schemas-microsoft-com:vml" xmlns:pvml="urn:schemas-microsoft-com:office:powerpoint" xmlns:com="http://schemas.openxmlformats.org/drawingml/2006/compatibility" xmlns:p14="http://schemas.microsoft.com/office/powerpoint/2010/main" xmlns:p15="http://schemas.microsoft.com/office/powerpoint/2012/main" xmlns:ahyp="http://schemas.microsoft.com/office/drawing/2018/hyperlinkcolor">
-  <p:cSld>
-    <p:spTree>
-      <p:nvGrpSpPr>
-        <p:cNvPr id="144" name="Shape 144"/>
-        <p:cNvGrpSpPr/>
-        <p:nvPr/>
-      </p:nvGrpSpPr>
-      <p:grpSpPr>
-        <a:xfrm>
-          <a:off x="0" y="0"/>
-          <a:ext cx="0" cy="0"/>
-          <a:chOff x="0" y="0"/>
-          <a:chExt cx="0" cy="0"/>
-        </a:xfrm>
-      </p:grpSpPr>
-      <p:sp>
-        <p:nvSpPr>
-          <p:cNvPr id="145" name="Google Shape;145;p23"/>
-          <p:cNvSpPr txBox="1"/>
-          <p:nvPr>
-            <p:ph type="title"/>
-          </p:nvPr>
-        </p:nvSpPr>
-        <p:spPr>
-          <a:xfrm>
-            <a:off x="729450" y="575800"/>
-            <a:ext cx="7688700" cy="535200"/>
-          </a:xfrm>
-          <a:prstGeom prst="rect">
-            <a:avLst/>
-          </a:prstGeom>
-        </p:spPr>
-        <p:txBody>
-          <a:bodyPr anchorCtr="0" anchor="t" bIns="91425" lIns="91425" spcFirstLastPara="1" rIns="91425" wrap="square" tIns="91425">
-            <a:normAutofit fontScale="90000"/>
-          </a:bodyPr>
-          <a:lstStyle/>
+              </a:spcBef>
+              <a:spcAft>
+                <a:spcPts val="0"/>
+              </a:spcAft>
+              <a:buSzPts val="1200"/>
+              <a:buChar char="-"/>
+            </a:pPr>
+            <a:r>
+              <a:rPr lang="en" sz="1200"/>
+              <a:t>Note </a:t>
+            </a:r>
+            <a:endParaRPr sz="1200"/>
+          </a:p>
+          <a:p>
+            <a:pPr indent="-304800" lvl="0" marL="457200" rtl="0" algn="l">
+              <a:spcBef>
+                <a:spcPts val="0"/>
+              </a:spcBef>
+              <a:spcAft>
+                <a:spcPts val="0"/>
+              </a:spcAft>
+              <a:buSzPts val="1200"/>
+              <a:buChar char="-"/>
+            </a:pPr>
+            <a:r>
+              <a:rPr lang="en" sz="1200"/>
+              <a:t>Warning </a:t>
+            </a:r>
+            <a:endParaRPr sz="1200"/>
+          </a:p>
+          <a:p>
+            <a:pPr indent="-304800" lvl="0" marL="457200" rtl="0" algn="l">
+              <a:spcBef>
+                <a:spcPts val="0"/>
+              </a:spcBef>
+              <a:spcAft>
+                <a:spcPts val="0"/>
+              </a:spcAft>
+              <a:buSzPts val="1200"/>
+              <a:buChar char="-"/>
+            </a:pPr>
+            <a:r>
+              <a:rPr lang="en" sz="1200"/>
+              <a:t>Error</a:t>
+            </a:r>
+            <a:endParaRPr sz="1200"/>
+          </a:p>
+          <a:p>
+            <a:pPr indent="-304800" lvl="0" marL="457200" rtl="0" algn="l">
+              <a:spcBef>
+                <a:spcPts val="0"/>
+              </a:spcBef>
+              <a:spcAft>
+                <a:spcPts val="0"/>
+              </a:spcAft>
+              <a:buSzPts val="1200"/>
+              <a:buChar char="-"/>
+            </a:pPr>
+            <a:r>
+              <a:rPr lang="en" sz="1200"/>
+              <a:t>Failure </a:t>
+            </a:r>
+            <a:endParaRPr sz="1200"/>
+          </a:p>
           <a:p>
             <a:pPr indent="0" lvl="0" marL="0" rtl="0" algn="l">
               <a:spcBef>
-                <a:spcPts val="0"/>
-              </a:spcBef>
-              <a:spcAft>
-                <a:spcPts val="0"/>
-              </a:spcAft>
-              <a:buNone/>
-            </a:pPr>
-            <a:r>
-              <a:rPr lang="en"/>
-              <a:t>Technical Questions </a:t>
-            </a:r>
-            <a:r>
-              <a:rPr lang="en"/>
-              <a:t>(Assert Command)</a:t>
-            </a:r>
-            <a:endParaRPr/>
-          </a:p>
-        </p:txBody>
-      </p:sp>
-      <p:sp>
-        <p:nvSpPr>
-          <p:cNvPr id="146" name="Google Shape;146;p23"/>
-          <p:cNvSpPr txBox="1"/>
-          <p:nvPr>
-            <p:ph idx="1" type="body"/>
-          </p:nvPr>
-        </p:nvSpPr>
-        <p:spPr>
-          <a:xfrm>
-            <a:off x="729450" y="1438675"/>
-            <a:ext cx="7688700" cy="2901300"/>
-          </a:xfrm>
-          <a:prstGeom prst="rect">
-            <a:avLst/>
-          </a:prstGeom>
-        </p:spPr>
-        <p:txBody>
-          <a:bodyPr anchorCtr="0" anchor="t" bIns="91425" lIns="91425" spcFirstLastPara="1" rIns="91425" wrap="square" tIns="91425">
-            <a:normAutofit/>
-          </a:bodyPr>
-          <a:lstStyle/>
+                <a:spcPts val="1200"/>
+              </a:spcBef>
+              <a:spcAft>
+                <a:spcPts val="0"/>
+              </a:spcAft>
+              <a:buNone/>
+            </a:pPr>
+            <a:r>
+              <a:rPr lang="en" sz="1200"/>
+              <a:t>Asserts can be written as an ‘else’ statement. For example 1+1 =2. If any other result was to be achieved (3, 0, etc), then the else statement would use a failure level assert to abort the test. Automation can be achieved using the following method:</a:t>
+            </a:r>
+            <a:endParaRPr sz="1200"/>
+          </a:p>
+          <a:p>
+            <a:pPr indent="-304800" lvl="0" marL="457200" rtl="0" algn="l">
+              <a:spcBef>
+                <a:spcPts val="1200"/>
+              </a:spcBef>
+              <a:spcAft>
+                <a:spcPts val="0"/>
+              </a:spcAft>
+              <a:buSzPts val="1200"/>
+              <a:buChar char="-"/>
+            </a:pPr>
+            <a:r>
+              <a:rPr lang="en" sz="1200"/>
+              <a:t>Multiple .work files, A(1 or 2) + B(1 or 2) = C(1 or 2) for all of them</a:t>
+            </a:r>
+            <a:endParaRPr sz="1200"/>
+          </a:p>
+          <a:p>
+            <a:pPr indent="-304800" lvl="0" marL="457200" rtl="0" algn="l">
+              <a:spcBef>
+                <a:spcPts val="0"/>
+              </a:spcBef>
+              <a:spcAft>
+                <a:spcPts val="0"/>
+              </a:spcAft>
+              <a:buSzPts val="1200"/>
+              <a:buChar char="-"/>
+            </a:pPr>
+            <a:r>
+              <a:rPr lang="en" sz="1200"/>
+              <a:t>Assert C1 = C2 report “false” severity error;</a:t>
+            </a:r>
+            <a:endParaRPr sz="1200"/>
+          </a:p>
           <a:p>
             <a:pPr indent="0" lvl="0" marL="0" rtl="0" algn="l">
               <a:spcBef>
-                <a:spcPts val="0"/>
-              </a:spcBef>
-              <a:spcAft>
                 <a:spcPts val="1200"/>
-              </a:spcAft>
-              <a:buNone/>
-            </a:pPr>
-            <a:r>
-              <a:t/>
-            </a:r>
-            <a:endParaRPr/>
+              </a:spcBef>
+              <a:spcAft>
+                <a:spcPts val="1200"/>
+              </a:spcAft>
+              <a:buNone/>
+            </a:pPr>
+            <a:r>
+              <a:rPr lang="en" sz="1200"/>
+              <a:t>This compares the two C values, and checks that they are the same as one another. If not, the error line is reported in the console.</a:t>
+            </a:r>
+            <a:endParaRPr sz="1200"/>
           </a:p>
         </p:txBody>
       </p:sp>
@@ -9980,24 +9911,7 @@
               <a:buNone/>
             </a:pPr>
             <a:r>
-              <a:rPr lang="en" sz="1200"/>
-              <a:t>An example of my version </a:t>
-            </a:r>
-            <a:r>
-              <a:rPr lang="en" sz="1200"/>
-              <a:t>control</a:t>
-            </a:r>
-            <a:r>
-              <a:rPr lang="en" sz="1200"/>
-              <a:t> can be seen on the </a:t>
-            </a:r>
-            <a:r>
-              <a:rPr lang="en" sz="1200"/>
-              <a:t>next</a:t>
-            </a:r>
-            <a:r>
-              <a:rPr lang="en" sz="1200"/>
-              <a:t> slide.</a:t>
+              <a:t/>
             </a:r>
             <a:endParaRPr sz="1200"/>
           </a:p>
@@ -10028,34 +9942,9 @@
           <a:chExt cx="0" cy="0"/>
         </a:xfrm>
       </p:grpSpPr>
-    </p:spTree>
-  </p:cSld>
-  <p:clrMapOvr>
-    <a:masterClrMapping/>
-  </p:clrMapOvr>
-</p:sld>
-</file>
-
-<file path=ppt/slides/slide8.xml><?xml version="1.0" encoding="utf-8"?>
-<p:sld xmlns:a="http://schemas.openxmlformats.org/drawingml/2006/main" xmlns:r="http://schemas.openxmlformats.org/officeDocument/2006/relationships" xmlns:mc="http://schemas.openxmlformats.org/markup-compatibility/2006" xmlns:mv="urn:schemas-microsoft-com:mac:vml" xmlns:p="http://schemas.openxmlformats.org/presentationml/2006/main" xmlns:c="http://schemas.openxmlformats.org/drawingml/2006/chart" xmlns:dgm="http://schemas.openxmlformats.org/drawingml/2006/diagram" xmlns:o="urn:schemas-microsoft-com:office:office" xmlns:v="urn:schemas-microsoft-com:vml" xmlns:pvml="urn:schemas-microsoft-com:office:powerpoint" xmlns:com="http://schemas.openxmlformats.org/drawingml/2006/compatibility" xmlns:p14="http://schemas.microsoft.com/office/powerpoint/2010/main" xmlns:p15="http://schemas.microsoft.com/office/powerpoint/2012/main" xmlns:ahyp="http://schemas.microsoft.com/office/drawing/2018/hyperlinkcolor">
-  <p:cSld>
-    <p:spTree>
-      <p:nvGrpSpPr>
-        <p:cNvPr id="126" name="Shape 126"/>
-        <p:cNvGrpSpPr/>
-        <p:nvPr/>
-      </p:nvGrpSpPr>
-      <p:grpSpPr>
-        <a:xfrm>
-          <a:off x="0" y="0"/>
-          <a:ext cx="0" cy="0"/>
-          <a:chOff x="0" y="0"/>
-          <a:chExt cx="0" cy="0"/>
-        </a:xfrm>
-      </p:grpSpPr>
       <p:sp>
         <p:nvSpPr>
-          <p:cNvPr id="127" name="Google Shape;127;p20"/>
+          <p:cNvPr id="123" name="Google Shape;123;p19"/>
           <p:cNvSpPr txBox="1"/>
           <p:nvPr>
             <p:ph idx="2" type="body"/>
@@ -10160,7 +10049,7 @@
       </p:sp>
       <p:sp>
         <p:nvSpPr>
-          <p:cNvPr id="128" name="Google Shape;128;p20"/>
+          <p:cNvPr id="124" name="Google Shape;124;p19"/>
           <p:cNvSpPr txBox="1"/>
           <p:nvPr>
             <p:ph type="title"/>
@@ -10206,12 +10095,12 @@
 </p:sld>
 </file>
 
-<file path=ppt/slides/slide9.xml><?xml version="1.0" encoding="utf-8"?>
+<file path=ppt/slides/slide8.xml><?xml version="1.0" encoding="utf-8"?>
 <p:sld xmlns:a="http://schemas.openxmlformats.org/drawingml/2006/main" xmlns:r="http://schemas.openxmlformats.org/officeDocument/2006/relationships" xmlns:mc="http://schemas.openxmlformats.org/markup-compatibility/2006" xmlns:mv="urn:schemas-microsoft-com:mac:vml" xmlns:p="http://schemas.openxmlformats.org/presentationml/2006/main" xmlns:c="http://schemas.openxmlformats.org/drawingml/2006/chart" xmlns:dgm="http://schemas.openxmlformats.org/drawingml/2006/diagram" xmlns:o="urn:schemas-microsoft-com:office:office" xmlns:v="urn:schemas-microsoft-com:vml" xmlns:pvml="urn:schemas-microsoft-com:office:powerpoint" xmlns:com="http://schemas.openxmlformats.org/drawingml/2006/compatibility" xmlns:p14="http://schemas.microsoft.com/office/powerpoint/2010/main" xmlns:p15="http://schemas.microsoft.com/office/powerpoint/2012/main" xmlns:ahyp="http://schemas.microsoft.com/office/drawing/2018/hyperlinkcolor">
   <p:cSld>
     <p:spTree>
       <p:nvGrpSpPr>
-        <p:cNvPr id="132" name="Shape 132"/>
+        <p:cNvPr id="128" name="Shape 128"/>
         <p:cNvGrpSpPr/>
         <p:nvPr/>
       </p:nvGrpSpPr>
@@ -10225,7 +10114,7 @@
       </p:grpSpPr>
       <p:sp>
         <p:nvSpPr>
-          <p:cNvPr id="133" name="Google Shape;133;p21"/>
+          <p:cNvPr id="129" name="Google Shape;129;p20"/>
           <p:cNvSpPr txBox="1"/>
           <p:nvPr>
             <p:ph type="title"/>
@@ -10265,7 +10154,285 @@
       </p:sp>
       <p:sp>
         <p:nvSpPr>
-          <p:cNvPr id="134" name="Google Shape;134;p21"/>
+          <p:cNvPr id="130" name="Google Shape;130;p20"/>
+          <p:cNvSpPr txBox="1"/>
+          <p:nvPr>
+            <p:ph idx="1" type="body"/>
+          </p:nvPr>
+        </p:nvSpPr>
+        <p:spPr>
+          <a:xfrm>
+            <a:off x="729450" y="1438675"/>
+            <a:ext cx="7688700" cy="3535500"/>
+          </a:xfrm>
+          <a:prstGeom prst="rect">
+            <a:avLst/>
+          </a:prstGeom>
+        </p:spPr>
+        <p:txBody>
+          <a:bodyPr anchorCtr="0" anchor="t" bIns="91425" lIns="91425" spcFirstLastPara="1" rIns="91425" wrap="square" tIns="91425">
+            <a:noAutofit/>
+          </a:bodyPr>
+          <a:lstStyle/>
+          <a:p>
+            <a:pPr indent="0" lvl="0" marL="0" rtl="0" algn="l">
+              <a:spcBef>
+                <a:spcPts val="0"/>
+              </a:spcBef>
+              <a:spcAft>
+                <a:spcPts val="0"/>
+              </a:spcAft>
+              <a:buNone/>
+            </a:pPr>
+            <a:r>
+              <a:rPr lang="en" sz="1200"/>
+              <a:t>Signals and variables are very similar, but there are some clear and distinct differences. To begin, they are defined in different places:</a:t>
+            </a:r>
+            <a:endParaRPr sz="1200"/>
+          </a:p>
+          <a:p>
+            <a:pPr indent="-304800" lvl="0" marL="457200" rtl="0" algn="l">
+              <a:spcBef>
+                <a:spcPts val="1200"/>
+              </a:spcBef>
+              <a:spcAft>
+                <a:spcPts val="0"/>
+              </a:spcAft>
+              <a:buSzPts val="1200"/>
+              <a:buChar char="-"/>
+            </a:pPr>
+            <a:r>
+              <a:rPr lang="en" sz="1200"/>
+              <a:t>A signal is defined in architecture </a:t>
+            </a:r>
+            <a:endParaRPr sz="1200"/>
+          </a:p>
+          <a:p>
+            <a:pPr indent="-304800" lvl="0" marL="457200" rtl="0" algn="l">
+              <a:spcBef>
+                <a:spcPts val="0"/>
+              </a:spcBef>
+              <a:spcAft>
+                <a:spcPts val="0"/>
+              </a:spcAft>
+              <a:buSzPts val="1200"/>
+              <a:buChar char="-"/>
+            </a:pPr>
+            <a:r>
+              <a:rPr lang="en" sz="1200"/>
+              <a:t>A variable is defined in the process block</a:t>
+            </a:r>
+            <a:endParaRPr sz="1200"/>
+          </a:p>
+          <a:p>
+            <a:pPr indent="0" lvl="0" marL="0" rtl="0" algn="l">
+              <a:spcBef>
+                <a:spcPts val="1200"/>
+              </a:spcBef>
+              <a:spcAft>
+                <a:spcPts val="0"/>
+              </a:spcAft>
+              <a:buNone/>
+            </a:pPr>
+            <a:r>
+              <a:rPr lang="en" sz="1200"/>
+              <a:t>The notation for assignment is also different:</a:t>
+            </a:r>
+            <a:endParaRPr sz="1200"/>
+          </a:p>
+          <a:p>
+            <a:pPr indent="-304800" lvl="0" marL="457200" rtl="0" algn="l">
+              <a:spcBef>
+                <a:spcPts val="1200"/>
+              </a:spcBef>
+              <a:spcAft>
+                <a:spcPts val="0"/>
+              </a:spcAft>
+              <a:buSzPts val="1200"/>
+              <a:buChar char="-"/>
+            </a:pPr>
+            <a:r>
+              <a:rPr lang="en" sz="1200"/>
+              <a:t>‘&lt;=’ for signals</a:t>
+            </a:r>
+            <a:endParaRPr sz="1200"/>
+          </a:p>
+          <a:p>
+            <a:pPr indent="-304800" lvl="0" marL="457200" rtl="0" algn="l">
+              <a:spcBef>
+                <a:spcPts val="0"/>
+              </a:spcBef>
+              <a:spcAft>
+                <a:spcPts val="0"/>
+              </a:spcAft>
+              <a:buSzPts val="1200"/>
+              <a:buChar char="-"/>
+            </a:pPr>
+            <a:r>
+              <a:rPr lang="en" sz="1200"/>
+              <a:t>‘:=’ for variables</a:t>
+            </a:r>
+            <a:endParaRPr sz="1200"/>
+          </a:p>
+          <a:p>
+            <a:pPr indent="0" lvl="0" marL="0" rtl="0" algn="l">
+              <a:spcBef>
+                <a:spcPts val="1200"/>
+              </a:spcBef>
+              <a:spcAft>
+                <a:spcPts val="0"/>
+              </a:spcAft>
+              <a:buNone/>
+            </a:pPr>
+            <a:r>
+              <a:rPr lang="en" sz="1200"/>
+              <a:t>There is also a difference in when they can be updated:</a:t>
+            </a:r>
+            <a:endParaRPr sz="1200"/>
+          </a:p>
+          <a:p>
+            <a:pPr indent="-304800" lvl="0" marL="457200" rtl="0" algn="l">
+              <a:spcBef>
+                <a:spcPts val="1200"/>
+              </a:spcBef>
+              <a:spcAft>
+                <a:spcPts val="0"/>
+              </a:spcAft>
+              <a:buSzPts val="1200"/>
+              <a:buChar char="-"/>
+            </a:pPr>
+            <a:r>
+              <a:rPr lang="en" sz="1200"/>
+              <a:t>Signals can only be updated when the process is paused</a:t>
+            </a:r>
+            <a:endParaRPr sz="1200"/>
+          </a:p>
+          <a:p>
+            <a:pPr indent="-304800" lvl="0" marL="457200" rtl="0" algn="l">
+              <a:spcBef>
+                <a:spcPts val="0"/>
+              </a:spcBef>
+              <a:spcAft>
+                <a:spcPts val="0"/>
+              </a:spcAft>
+              <a:buSzPts val="1200"/>
+              <a:buChar char="-"/>
+            </a:pPr>
+            <a:r>
+              <a:rPr lang="en" sz="1200"/>
+              <a:t>Variables can be updated at any time</a:t>
+            </a:r>
+            <a:endParaRPr sz="1200"/>
+          </a:p>
+          <a:p>
+            <a:pPr indent="0" lvl="0" marL="0" rtl="0" algn="l">
+              <a:spcBef>
+                <a:spcPts val="1200"/>
+              </a:spcBef>
+              <a:spcAft>
+                <a:spcPts val="0"/>
+              </a:spcAft>
+              <a:buNone/>
+            </a:pPr>
+            <a:r>
+              <a:rPr lang="en" sz="1200"/>
+              <a:t>A signal has a past history of values, whereas a variable </a:t>
+            </a:r>
+            <a:r>
+              <a:rPr lang="en" sz="1200"/>
+              <a:t>only exists at that current value.</a:t>
+            </a:r>
+            <a:endParaRPr sz="1200"/>
+          </a:p>
+          <a:p>
+            <a:pPr indent="0" lvl="0" marL="0" rtl="0" algn="l">
+              <a:spcBef>
+                <a:spcPts val="1200"/>
+              </a:spcBef>
+              <a:spcAft>
+                <a:spcPts val="1200"/>
+              </a:spcAft>
+              <a:buNone/>
+            </a:pPr>
+            <a:r>
+              <a:t/>
+            </a:r>
+            <a:endParaRPr/>
+          </a:p>
+        </p:txBody>
+      </p:sp>
+    </p:spTree>
+  </p:cSld>
+  <p:clrMapOvr>
+    <a:masterClrMapping/>
+  </p:clrMapOvr>
+</p:sld>
+</file>
+
+<file path=ppt/slides/slide9.xml><?xml version="1.0" encoding="utf-8"?>
+<p:sld xmlns:a="http://schemas.openxmlformats.org/drawingml/2006/main" xmlns:r="http://schemas.openxmlformats.org/officeDocument/2006/relationships" xmlns:mc="http://schemas.openxmlformats.org/markup-compatibility/2006" xmlns:mv="urn:schemas-microsoft-com:mac:vml" xmlns:p="http://schemas.openxmlformats.org/presentationml/2006/main" xmlns:c="http://schemas.openxmlformats.org/drawingml/2006/chart" xmlns:dgm="http://schemas.openxmlformats.org/drawingml/2006/diagram" xmlns:o="urn:schemas-microsoft-com:office:office" xmlns:v="urn:schemas-microsoft-com:vml" xmlns:pvml="urn:schemas-microsoft-com:office:powerpoint" xmlns:com="http://schemas.openxmlformats.org/drawingml/2006/compatibility" xmlns:p14="http://schemas.microsoft.com/office/powerpoint/2010/main" xmlns:p15="http://schemas.microsoft.com/office/powerpoint/2012/main" xmlns:ahyp="http://schemas.microsoft.com/office/drawing/2018/hyperlinkcolor">
+  <p:cSld>
+    <p:spTree>
+      <p:nvGrpSpPr>
+        <p:cNvPr id="134" name="Shape 134"/>
+        <p:cNvGrpSpPr/>
+        <p:nvPr/>
+      </p:nvGrpSpPr>
+      <p:grpSpPr>
+        <a:xfrm>
+          <a:off x="0" y="0"/>
+          <a:ext cx="0" cy="0"/>
+          <a:chOff x="0" y="0"/>
+          <a:chExt cx="0" cy="0"/>
+        </a:xfrm>
+      </p:grpSpPr>
+      <p:sp>
+        <p:nvSpPr>
+          <p:cNvPr id="135" name="Google Shape;135;p21"/>
+          <p:cNvSpPr txBox="1"/>
+          <p:nvPr>
+            <p:ph type="title"/>
+          </p:nvPr>
+        </p:nvSpPr>
+        <p:spPr>
+          <a:xfrm>
+            <a:off x="729450" y="575800"/>
+            <a:ext cx="7688700" cy="535200"/>
+          </a:xfrm>
+          <a:prstGeom prst="rect">
+            <a:avLst/>
+          </a:prstGeom>
+        </p:spPr>
+        <p:txBody>
+          <a:bodyPr anchorCtr="0" anchor="t" bIns="91425" lIns="91425" spcFirstLastPara="1" rIns="91425" wrap="square" tIns="91425">
+            <a:normAutofit fontScale="90000"/>
+          </a:bodyPr>
+          <a:lstStyle/>
+          <a:p>
+            <a:pPr indent="0" lvl="0" marL="0" rtl="0" algn="l">
+              <a:spcBef>
+                <a:spcPts val="0"/>
+              </a:spcBef>
+              <a:spcAft>
+                <a:spcPts val="0"/>
+              </a:spcAft>
+              <a:buNone/>
+            </a:pPr>
+            <a:r>
+              <a:rPr lang="en"/>
+              <a:t>Technical Questions</a:t>
+            </a:r>
+            <a:r>
+              <a:rPr lang="en"/>
+              <a:t> (Testbench Design)</a:t>
+            </a:r>
+            <a:endParaRPr/>
+          </a:p>
+        </p:txBody>
+      </p:sp>
+      <p:sp>
+        <p:nvSpPr>
+          <p:cNvPr id="136" name="Google Shape;136;p21"/>
           <p:cNvSpPr txBox="1"/>
           <p:nvPr>
             <p:ph idx="1" type="body"/>
@@ -10282,7 +10449,7 @@
         </p:spPr>
         <p:txBody>
           <a:bodyPr anchorCtr="0" anchor="t" bIns="91425" lIns="91425" spcFirstLastPara="1" rIns="91425" wrap="square" tIns="91425">
-            <a:normAutofit/>
+            <a:noAutofit/>
           </a:bodyPr>
           <a:lstStyle/>
           <a:p>
@@ -10291,14 +10458,216 @@
                 <a:spcPts val="0"/>
               </a:spcBef>
               <a:spcAft>
+                <a:spcPts val="0"/>
+              </a:spcAft>
+              <a:buNone/>
+            </a:pPr>
+            <a:r>
+              <a:rPr lang="en" sz="1200"/>
+              <a:t>Testbenches are useful for ensuring code is functional before attempting to use it. A basic explanation of testbench creation can be seen here:</a:t>
+            </a:r>
+            <a:endParaRPr sz="1200"/>
+          </a:p>
+          <a:p>
+            <a:pPr indent="-304800" lvl="0" marL="457200" rtl="0" algn="l">
+              <a:spcBef>
                 <a:spcPts val="1200"/>
+              </a:spcBef>
+              <a:spcAft>
+                <a:spcPts val="0"/>
+              </a:spcAft>
+              <a:buSzPts val="1200"/>
+              <a:buChar char="-"/>
+            </a:pPr>
+            <a:r>
+              <a:rPr lang="en" sz="1200"/>
+              <a:t>Create entity and architecture </a:t>
+            </a:r>
+            <a:endParaRPr sz="1200"/>
+          </a:p>
+          <a:p>
+            <a:pPr indent="-304800" lvl="1" marL="914400" rtl="0" algn="l">
+              <a:spcBef>
+                <a:spcPts val="0"/>
+              </a:spcBef>
+              <a:spcAft>
+                <a:spcPts val="0"/>
+              </a:spcAft>
+              <a:buSzPts val="1200"/>
+              <a:buChar char="-"/>
+            </a:pPr>
+            <a:r>
+              <a:rPr lang="en" sz="1200"/>
+              <a:t>Give the </a:t>
+            </a:r>
+            <a:r>
+              <a:rPr lang="en" sz="1200"/>
+              <a:t>architecture</a:t>
+            </a:r>
+            <a:r>
+              <a:rPr lang="en" sz="1200"/>
+              <a:t> the correct signals and assignments</a:t>
+            </a:r>
+            <a:endParaRPr sz="1200"/>
+          </a:p>
+          <a:p>
+            <a:pPr indent="-304800" lvl="0" marL="457200" rtl="0" algn="l">
+              <a:spcBef>
+                <a:spcPts val="0"/>
+              </a:spcBef>
+              <a:spcAft>
+                <a:spcPts val="0"/>
+              </a:spcAft>
+              <a:buSzPts val="1200"/>
+              <a:buChar char="-"/>
+            </a:pPr>
+            <a:r>
+              <a:rPr lang="en" sz="1200"/>
+              <a:t>Create a port map</a:t>
+            </a:r>
+            <a:endParaRPr sz="1200"/>
+          </a:p>
+          <a:p>
+            <a:pPr indent="-304800" lvl="1" marL="914400" rtl="0" algn="l">
+              <a:spcBef>
+                <a:spcPts val="0"/>
+              </a:spcBef>
+              <a:spcAft>
+                <a:spcPts val="0"/>
+              </a:spcAft>
+              <a:buSzPts val="1200"/>
+              <a:buChar char="-"/>
+            </a:pPr>
+            <a:r>
+              <a:rPr lang="en" sz="1200"/>
+              <a:t>A map of what </a:t>
+            </a:r>
+            <a:r>
+              <a:rPr lang="en" sz="1200"/>
+              <a:t>component is connected to where</a:t>
+            </a:r>
+            <a:endParaRPr sz="1200"/>
+          </a:p>
+          <a:p>
+            <a:pPr indent="-304800" lvl="0" marL="457200" rtl="0" algn="l">
+              <a:spcBef>
+                <a:spcPts val="0"/>
+              </a:spcBef>
+              <a:spcAft>
+                <a:spcPts val="0"/>
+              </a:spcAft>
+              <a:buSzPts val="1200"/>
+              <a:buChar char="-"/>
+            </a:pPr>
+            <a:r>
+              <a:rPr lang="en" sz="1200"/>
+              <a:t>Generate a clock and a reset </a:t>
+            </a:r>
+            <a:endParaRPr sz="1200"/>
+          </a:p>
+          <a:p>
+            <a:pPr indent="-304800" lvl="0" marL="457200" rtl="0" algn="l">
+              <a:spcBef>
+                <a:spcPts val="0"/>
+              </a:spcBef>
+              <a:spcAft>
+                <a:spcPts val="0"/>
+              </a:spcAft>
+              <a:buSzPts val="1200"/>
+              <a:buChar char="-"/>
+            </a:pPr>
+            <a:r>
+              <a:rPr lang="en" sz="1200"/>
+              <a:t>Write the process block</a:t>
+            </a:r>
+            <a:endParaRPr sz="1200"/>
+          </a:p>
+          <a:p>
+            <a:pPr indent="-304800" lvl="1" marL="914400" rtl="0" algn="l">
+              <a:spcBef>
+                <a:spcPts val="0"/>
+              </a:spcBef>
+              <a:spcAft>
+                <a:spcPts val="0"/>
+              </a:spcAft>
+              <a:buSzPts val="1200"/>
+              <a:buChar char="-"/>
+            </a:pPr>
+            <a:r>
+              <a:rPr lang="en" sz="1200"/>
+              <a:t>The meat of the testbench </a:t>
+            </a:r>
+            <a:endParaRPr sz="1200"/>
+          </a:p>
+          <a:p>
+            <a:pPr indent="-304800" lvl="1" marL="914400" rtl="0" algn="l">
+              <a:spcBef>
+                <a:spcPts val="0"/>
+              </a:spcBef>
+              <a:spcAft>
+                <a:spcPts val="0"/>
+              </a:spcAft>
+              <a:buSzPts val="1200"/>
+              <a:buChar char="-"/>
+            </a:pPr>
+            <a:r>
+              <a:rPr lang="en" sz="1200"/>
+              <a:t>Action - wait - action - wait - … </a:t>
+            </a:r>
+            <a:endParaRPr sz="1200"/>
+          </a:p>
+          <a:p>
+            <a:pPr indent="-304800" lvl="0" marL="457200" rtl="0" algn="l">
+              <a:spcBef>
+                <a:spcPts val="0"/>
+              </a:spcBef>
+              <a:spcAft>
+                <a:spcPts val="0"/>
+              </a:spcAft>
+              <a:buSzPts val="1200"/>
+              <a:buChar char="-"/>
+            </a:pPr>
+            <a:r>
+              <a:rPr lang="en" sz="1200"/>
+              <a:t>This can be improved with the assert command</a:t>
+            </a:r>
+            <a:endParaRPr sz="1200"/>
+          </a:p>
+          <a:p>
+            <a:pPr indent="0" lvl="0" marL="0" rtl="0" algn="l">
+              <a:spcBef>
+                <a:spcPts val="1200"/>
+              </a:spcBef>
+              <a:spcAft>
+                <a:spcPts val="0"/>
+              </a:spcAft>
+              <a:buNone/>
+            </a:pPr>
+            <a:r>
+              <a:rPr lang="en" sz="1200" u="sng">
+                <a:solidFill>
+                  <a:schemeClr val="hlink"/>
+                </a:solidFill>
+                <a:hlinkClick r:id="rId3"/>
+              </a:rPr>
+              <a:t>https://fpgatutorial.com/how-to-write-a-basic-testbench-using-vhdl/</a:t>
+            </a:r>
+            <a:endParaRPr sz="1200"/>
+          </a:p>
+          <a:p>
+            <a:pPr indent="0" lvl="0" marL="0" rtl="0" algn="l">
+              <a:spcBef>
+                <a:spcPts val="1200"/>
+              </a:spcBef>
+              <a:spcAft>
+                <a:spcPts val="1200"/>
               </a:spcAft>
               <a:buNone/>
             </a:pPr>
             <a:r>
               <a:t/>
             </a:r>
-            <a:endParaRPr/>
+            <a:endParaRPr sz="1200"/>
           </a:p>
         </p:txBody>
       </p:sp>
@@ -10311,6 +10680,285 @@
 </file>
 
 <file path=ppt/theme/theme1.xml><?xml version="1.0" encoding="utf-8"?>
+<a:theme xmlns:a="http://schemas.openxmlformats.org/drawingml/2006/main" xmlns:r="http://schemas.openxmlformats.org/officeDocument/2006/relationships" name="Streamline">
+  <a:themeElements>
+    <a:clrScheme name="Streamline">
+      <a:dk1>
+        <a:srgbClr val="1A9988"/>
+      </a:dk1>
+      <a:lt1>
+        <a:srgbClr val="FFFFFF"/>
+      </a:lt1>
+      <a:dk2>
+        <a:srgbClr val="1A1A1A"/>
+      </a:dk2>
+      <a:lt2>
+        <a:srgbClr val="E9EDEE"/>
+      </a:lt2>
+      <a:accent1>
+        <a:srgbClr val="595959"/>
+      </a:accent1>
+      <a:accent2>
+        <a:srgbClr val="6AA4C8"/>
+      </a:accent2>
+      <a:accent3>
+        <a:srgbClr val="EB5600"/>
+      </a:accent3>
+      <a:accent4>
+        <a:srgbClr val="A2FFE8"/>
+      </a:accent4>
+      <a:accent5>
+        <a:srgbClr val="1C3678"/>
+      </a:accent5>
+      <a:accent6>
+        <a:srgbClr val="FFB8A2"/>
+      </a:accent6>
+      <a:hlink>
+        <a:srgbClr val="1C3678"/>
+      </a:hlink>
+      <a:folHlink>
+        <a:srgbClr val="1C3678"/>
+      </a:folHlink>
+    </a:clrScheme>
+    <a:fontScheme name="Office">
+      <a:majorFont>
+        <a:latin typeface="Arial"/>
+        <a:ea typeface=""/>
+        <a:cs typeface=""/>
+        <a:font script="Jpan" typeface="ＭＳ Ｐゴシック"/>
+        <a:font script="Hang" typeface="맑은 고딕"/>
+        <a:font script="Hans" typeface="宋体"/>
+        <a:font script="Hant" typeface="新細明體"/>
+        <a:font script="Arab" typeface="Times New Roman"/>
+        <a:font script="Hebr" typeface="Times New Roman"/>
+        <a:font script="Thai" typeface="Angsana New"/>
+        <a:font script="Ethi" typeface="Nyala"/>
+        <a:font script="Beng" typeface="Vrinda"/>
+        <a:font script="Gujr" typeface="Shruti"/>
+        <a:font script="Khmr" typeface="MoolBoran"/>
+        <a:font script="Knda" typeface="Tunga"/>
+        <a:font script="Guru" typeface="Raavi"/>
+        <a:font script="Cans" typeface="Euphemia"/>
+        <a:font script="Cher" typeface="Plantagenet Cherokee"/>
+        <a:font script="Yiii" typeface="Microsoft Yi Baiti"/>
+        <a:font script="Tibt" typeface="Microsoft Himalaya"/>
+        <a:font script="Thaa" typeface="MV Boli"/>
+        <a:font script="Deva" typeface="Mangal"/>
+        <a:font script="Telu" typeface="Gautami"/>
+        <a:font script="Taml" typeface="Latha"/>
+        <a:font script="Syrc" typeface="Estrangelo Edessa"/>
+        <a:font script="Orya" typeface="Kalinga"/>
+        <a:font script="Mlym" typeface="Kartika"/>
+        <a:font script="Laoo" typeface="DokChampa"/>
+        <a:font script="Sinh" typeface="Iskoola Pota"/>
+        <a:font script="Mong" typeface="Mongolian Baiti"/>
+        <a:font script="Viet" typeface="Times New Roman"/>
+        <a:font script="Uigh" typeface="Microsoft Uighur"/>
+        <a:font script="Geor" typeface="Sylfaen"/>
+      </a:majorFont>
+      <a:minorFont>
+        <a:latin typeface="Arial"/>
+        <a:ea typeface=""/>
+        <a:cs typeface=""/>
+        <a:font script="Jpan" typeface="ＭＳ Ｐゴシック"/>
+        <a:font script="Hang" typeface="맑은 고딕"/>
+        <a:font script="Hans" typeface="宋体"/>
+        <a:font script="Hant" typeface="新細明體"/>
+        <a:font script="Arab" typeface="Arial"/>
+        <a:font script="Hebr" typeface="Arial"/>
+        <a:font script="Thai" typeface="Cordia New"/>
+        <a:font script="Ethi" typeface="Nyala"/>
+        <a:font script="Beng" typeface="Vrinda"/>
+        <a:font script="Gujr" typeface="Shruti"/>
+        <a:font script="Khmr" typeface="DaunPenh"/>
+        <a:font script="Knda" typeface="Tunga"/>
+        <a:font script="Guru" typeface="Raavi"/>
+        <a:font script="Cans" typeface="Euphemia"/>
+        <a:font script="Cher" typeface="Plantagenet Cherokee"/>
+        <a:font script="Yiii" typeface="Microsoft Yi Baiti"/>
+        <a:font script="Tibt" typeface="Microsoft Himalaya"/>
+        <a:font script="Thaa" typeface="MV Boli"/>
+        <a:font script="Deva" typeface="Mangal"/>
+        <a:font script="Telu" typeface="Gautami"/>
+        <a:font script="Taml" typeface="Latha"/>
+        <a:font script="Syrc" typeface="Estrangelo Edessa"/>
+        <a:font script="Orya" typeface="Kalinga"/>
+        <a:font script="Mlym" typeface="Kartika"/>
+        <a:font script="Laoo" typeface="DokChampa"/>
+        <a:font script="Sinh" typeface="Iskoola Pota"/>
+        <a:font script="Mong" typeface="Mongolian Baiti"/>
+        <a:font script="Viet" typeface="Arial"/>
+        <a:font script="Uigh" typeface="Microsoft Uighur"/>
+        <a:font script="Geor" typeface="Sylfaen"/>
+      </a:minorFont>
+    </a:fontScheme>
+    <a:fmtScheme name="Office">
+      <a:fillStyleLst>
+        <a:solidFill>
+          <a:schemeClr val="phClr"/>
+        </a:solidFill>
+        <a:gradFill rotWithShape="1">
+          <a:gsLst>
+            <a:gs pos="0">
+              <a:schemeClr val="phClr">
+                <a:tint val="50000"/>
+                <a:satMod val="300000"/>
+              </a:schemeClr>
+            </a:gs>
+            <a:gs pos="35000">
+              <a:schemeClr val="phClr">
+                <a:tint val="37000"/>
+                <a:satMod val="300000"/>
+              </a:schemeClr>
+            </a:gs>
+            <a:gs pos="100000">
+              <a:schemeClr val="phClr">
+                <a:tint val="15000"/>
+                <a:satMod val="350000"/>
+              </a:schemeClr>
+            </a:gs>
+          </a:gsLst>
+          <a:lin ang="16200000" scaled="1"/>
+        </a:gradFill>
+        <a:gradFill rotWithShape="1">
+          <a:gsLst>
+            <a:gs pos="0">
+              <a:schemeClr val="phClr">
+                <a:tint val="100000"/>
+                <a:shade val="100000"/>
+                <a:satMod val="130000"/>
+              </a:schemeClr>
+            </a:gs>
+            <a:gs pos="100000">
+              <a:schemeClr val="phClr">
+                <a:tint val="50000"/>
+                <a:shade val="100000"/>
+                <a:satMod val="350000"/>
+              </a:schemeClr>
+            </a:gs>
+          </a:gsLst>
+          <a:lin ang="16200000" scaled="0"/>
+        </a:gradFill>
+      </a:fillStyleLst>
+      <a:lnStyleLst>
+        <a:ln w="9525" cap="flat" cmpd="sng" algn="ctr">
+          <a:solidFill>
+            <a:schemeClr val="phClr">
+              <a:shade val="95000"/>
+              <a:satMod val="105000"/>
+            </a:schemeClr>
+          </a:solidFill>
+          <a:prstDash val="solid"/>
+        </a:ln>
+        <a:ln w="25400" cap="flat" cmpd="sng" algn="ctr">
+          <a:solidFill>
+            <a:schemeClr val="phClr"/>
+          </a:solidFill>
+          <a:prstDash val="solid"/>
+        </a:ln>
+        <a:ln w="38100" cap="flat" cmpd="sng" algn="ctr">
+          <a:solidFill>
+            <a:schemeClr val="phClr"/>
+          </a:solidFill>
+          <a:prstDash val="solid"/>
+        </a:ln>
+      </a:lnStyleLst>
+      <a:effectStyleLst>
+        <a:effectStyle>
+          <a:effectLst>
+            <a:outerShdw blurRad="40000" dist="20000" dir="5400000" rotWithShape="0">
+              <a:srgbClr val="000000">
+                <a:alpha val="38000"/>
+              </a:srgbClr>
+            </a:outerShdw>
+          </a:effectLst>
+        </a:effectStyle>
+        <a:effectStyle>
+          <a:effectLst>
+            <a:outerShdw blurRad="40000" dist="23000" dir="5400000" rotWithShape="0">
+              <a:srgbClr val="000000">
+                <a:alpha val="35000"/>
+              </a:srgbClr>
+            </a:outerShdw>
+          </a:effectLst>
+        </a:effectStyle>
+        <a:effectStyle>
+          <a:effectLst>
+            <a:outerShdw blurRad="40000" dist="23000" dir="5400000" rotWithShape="0">
+              <a:srgbClr val="000000">
+                <a:alpha val="35000"/>
+              </a:srgbClr>
+            </a:outerShdw>
+          </a:effectLst>
+          <a:scene3d>
+            <a:camera prst="orthographicFront">
+              <a:rot lat="0" lon="0" rev="0"/>
+            </a:camera>
+            <a:lightRig rig="threePt" dir="t">
+              <a:rot lat="0" lon="0" rev="1200000"/>
+            </a:lightRig>
+          </a:scene3d>
+          <a:sp3d>
+            <a:bevelT w="63500" h="25400"/>
+          </a:sp3d>
+        </a:effectStyle>
+      </a:effectStyleLst>
+      <a:bgFillStyleLst>
+        <a:solidFill>
+          <a:schemeClr val="phClr"/>
+        </a:solidFill>
+        <a:gradFill rotWithShape="1">
+          <a:gsLst>
+            <a:gs pos="0">
+              <a:schemeClr val="phClr">
+                <a:tint val="40000"/>
+                <a:satMod val="350000"/>
+              </a:schemeClr>
+            </a:gs>
+            <a:gs pos="40000">
+              <a:schemeClr val="phClr">
+                <a:tint val="45000"/>
+                <a:shade val="99000"/>
+                <a:satMod val="350000"/>
+              </a:schemeClr>
+            </a:gs>
+            <a:gs pos="100000">
+              <a:schemeClr val="phClr">
+                <a:shade val="20000"/>
+                <a:satMod val="255000"/>
+              </a:schemeClr>
+            </a:gs>
+          </a:gsLst>
+          <a:path path="circle">
+            <a:fillToRect l="50000" t="-80000" r="50000" b="180000"/>
+          </a:path>
+        </a:gradFill>
+        <a:gradFill rotWithShape="1">
+          <a:gsLst>
+            <a:gs pos="0">
+              <a:schemeClr val="phClr">
+                <a:tint val="80000"/>
+                <a:satMod val="300000"/>
+              </a:schemeClr>
+            </a:gs>
+            <a:gs pos="100000">
+              <a:schemeClr val="phClr">
+                <a:shade val="30000"/>
+                <a:satMod val="200000"/>
+              </a:schemeClr>
+            </a:gs>
+          </a:gsLst>
+          <a:path path="circle">
+            <a:fillToRect l="50000" t="50000" r="50000" b="50000"/>
+          </a:path>
+        </a:gradFill>
+      </a:bgFillStyleLst>
+    </a:fmtScheme>
+  </a:themeElements>
+</a:theme>
+</file>
+
+<file path=ppt/theme/theme2.xml><?xml version="1.0" encoding="utf-8"?>
 <a:theme xmlns:a="http://schemas.openxmlformats.org/drawingml/2006/main" xmlns:r="http://schemas.openxmlformats.org/officeDocument/2006/relationships">
   <a:themeElements>
     <a:clrScheme name="Default">
@@ -10587,283 +11235,4 @@
     </a:fmtScheme>
   </a:themeElements>
 </a:theme>
-</file>
-
-<file path=ppt/theme/theme2.xml><?xml version="1.0" encoding="utf-8"?>
-<a:theme xmlns:a="http://schemas.openxmlformats.org/drawingml/2006/main" xmlns:r="http://schemas.openxmlformats.org/officeDocument/2006/relationships" name="Streamline">
-  <a:themeElements>
-    <a:clrScheme name="Streamline">
-      <a:dk1>
-        <a:srgbClr val="1A9988"/>
-      </a:dk1>
-      <a:lt1>
-        <a:srgbClr val="FFFFFF"/>
-      </a:lt1>
-      <a:dk2>
-        <a:srgbClr val="1A1A1A"/>
-      </a:dk2>
-      <a:lt2>
-        <a:srgbClr val="E9EDEE"/>
-      </a:lt2>
-      <a:accent1>
-        <a:srgbClr val="595959"/>
-      </a:accent1>
-      <a:accent2>
-        <a:srgbClr val="6AA4C8"/>
-      </a:accent2>
-      <a:accent3>
-        <a:srgbClr val="EB5600"/>
-      </a:accent3>
-      <a:accent4>
-        <a:srgbClr val="A2FFE8"/>
-      </a:accent4>
-      <a:accent5>
-        <a:srgbClr val="1C3678"/>
-      </a:accent5>
-      <a:accent6>
-        <a:srgbClr val="FFB8A2"/>
-      </a:accent6>
-      <a:hlink>
-        <a:srgbClr val="1C3678"/>
-      </a:hlink>
-      <a:folHlink>
-        <a:srgbClr val="1C3678"/>
-      </a:folHlink>
-    </a:clrScheme>
-    <a:fontScheme name="Office">
-      <a:majorFont>
-        <a:latin typeface="Arial"/>
-        <a:ea typeface=""/>
-        <a:cs typeface=""/>
-        <a:font script="Jpan" typeface="ＭＳ Ｐゴシック"/>
-        <a:font script="Hang" typeface="맑은 고딕"/>
-        <a:font script="Hans" typeface="宋体"/>
-        <a:font script="Hant" typeface="新細明體"/>
-        <a:font script="Arab" typeface="Times New Roman"/>
-        <a:font script="Hebr" typeface="Times New Roman"/>
-        <a:font script="Thai" typeface="Angsana New"/>
-        <a:font script="Ethi" typeface="Nyala"/>
-        <a:font script="Beng" typeface="Vrinda"/>
-        <a:font script="Gujr" typeface="Shruti"/>
-        <a:font script="Khmr" typeface="MoolBoran"/>
-        <a:font script="Knda" typeface="Tunga"/>
-        <a:font script="Guru" typeface="Raavi"/>
-        <a:font script="Cans" typeface="Euphemia"/>
-        <a:font script="Cher" typeface="Plantagenet Cherokee"/>
-        <a:font script="Yiii" typeface="Microsoft Yi Baiti"/>
-        <a:font script="Tibt" typeface="Microsoft Himalaya"/>
-        <a:font script="Thaa" typeface="MV Boli"/>
-        <a:font script="Deva" typeface="Mangal"/>
-        <a:font script="Telu" typeface="Gautami"/>
-        <a:font script="Taml" typeface="Latha"/>
-        <a:font script="Syrc" typeface="Estrangelo Edessa"/>
-        <a:font script="Orya" typeface="Kalinga"/>
-        <a:font script="Mlym" typeface="Kartika"/>
-        <a:font script="Laoo" typeface="DokChampa"/>
-        <a:font script="Sinh" typeface="Iskoola Pota"/>
-        <a:font script="Mong" typeface="Mongolian Baiti"/>
-        <a:font script="Viet" typeface="Times New Roman"/>
-        <a:font script="Uigh" typeface="Microsoft Uighur"/>
-        <a:font script="Geor" typeface="Sylfaen"/>
-      </a:majorFont>
-      <a:minorFont>
-        <a:latin typeface="Arial"/>
-        <a:ea typeface=""/>
-        <a:cs typeface=""/>
-        <a:font script="Jpan" typeface="ＭＳ Ｐゴシック"/>
-        <a:font script="Hang" typeface="맑은 고딕"/>
-        <a:font script="Hans" typeface="宋体"/>
-        <a:font script="Hant" typeface="新細明體"/>
-        <a:font script="Arab" typeface="Arial"/>
-        <a:font script="Hebr" typeface="Arial"/>
-        <a:font script="Thai" typeface="Cordia New"/>
-        <a:font script="Ethi" typeface="Nyala"/>
-        <a:font script="Beng" typeface="Vrinda"/>
-        <a:font script="Gujr" typeface="Shruti"/>
-        <a:font script="Khmr" typeface="DaunPenh"/>
-        <a:font script="Knda" typeface="Tunga"/>
-        <a:font script="Guru" typeface="Raavi"/>
-        <a:font script="Cans" typeface="Euphemia"/>
-        <a:font script="Cher" typeface="Plantagenet Cherokee"/>
-        <a:font script="Yiii" typeface="Microsoft Yi Baiti"/>
-        <a:font script="Tibt" typeface="Microsoft Himalaya"/>
-        <a:font script="Thaa" typeface="MV Boli"/>
-        <a:font script="Deva" typeface="Mangal"/>
-        <a:font script="Telu" typeface="Gautami"/>
-        <a:font script="Taml" typeface="Latha"/>
-        <a:font script="Syrc" typeface="Estrangelo Edessa"/>
-        <a:font script="Orya" typeface="Kalinga"/>
-        <a:font script="Mlym" typeface="Kartika"/>
-        <a:font script="Laoo" typeface="DokChampa"/>
-        <a:font script="Sinh" typeface="Iskoola Pota"/>
-        <a:font script="Mong" typeface="Mongolian Baiti"/>
-        <a:font script="Viet" typeface="Arial"/>
-        <a:font script="Uigh" typeface="Microsoft Uighur"/>
-        <a:font script="Geor" typeface="Sylfaen"/>
-      </a:minorFont>
-    </a:fontScheme>
-    <a:fmtScheme name="Office">
-      <a:fillStyleLst>
-        <a:solidFill>
-          <a:schemeClr val="phClr"/>
-        </a:solidFill>
-        <a:gradFill rotWithShape="1">
-          <a:gsLst>
-            <a:gs pos="0">
-              <a:schemeClr val="phClr">
-                <a:tint val="50000"/>
-                <a:satMod val="300000"/>
-              </a:schemeClr>
-            </a:gs>
-            <a:gs pos="35000">
-              <a:schemeClr val="phClr">
-                <a:tint val="37000"/>
-                <a:satMod val="300000"/>
-              </a:schemeClr>
-            </a:gs>
-            <a:gs pos="100000">
-              <a:schemeClr val="phClr">
-                <a:tint val="15000"/>
-                <a:satMod val="350000"/>
-              </a:schemeClr>
-            </a:gs>
-          </a:gsLst>
-          <a:lin ang="16200000" scaled="1"/>
-        </a:gradFill>
-        <a:gradFill rotWithShape="1">
-          <a:gsLst>
-            <a:gs pos="0">
-              <a:schemeClr val="phClr">
-                <a:tint val="100000"/>
-                <a:shade val="100000"/>
-                <a:satMod val="130000"/>
-              </a:schemeClr>
-            </a:gs>
-            <a:gs pos="100000">
-              <a:schemeClr val="phClr">
-                <a:tint val="50000"/>
-                <a:shade val="100000"/>
-                <a:satMod val="350000"/>
-              </a:schemeClr>
-            </a:gs>
-          </a:gsLst>
-          <a:lin ang="16200000" scaled="0"/>
-        </a:gradFill>
-      </a:fillStyleLst>
-      <a:lnStyleLst>
-        <a:ln w="9525" cap="flat" cmpd="sng" algn="ctr">
-          <a:solidFill>
-            <a:schemeClr val="phClr">
-              <a:shade val="95000"/>
-              <a:satMod val="105000"/>
-            </a:schemeClr>
-          </a:solidFill>
-          <a:prstDash val="solid"/>
-        </a:ln>
-        <a:ln w="25400" cap="flat" cmpd="sng" algn="ctr">
-          <a:solidFill>
-            <a:schemeClr val="phClr"/>
-          </a:solidFill>
-          <a:prstDash val="solid"/>
-        </a:ln>
-        <a:ln w="38100" cap="flat" cmpd="sng" algn="ctr">
-          <a:solidFill>
-            <a:schemeClr val="phClr"/>
-          </a:solidFill>
-          <a:prstDash val="solid"/>
-        </a:ln>
-      </a:lnStyleLst>
-      <a:effectStyleLst>
-        <a:effectStyle>
-          <a:effectLst>
-            <a:outerShdw blurRad="40000" dist="20000" dir="5400000" rotWithShape="0">
-              <a:srgbClr val="000000">
-                <a:alpha val="38000"/>
-              </a:srgbClr>
-            </a:outerShdw>
-          </a:effectLst>
-        </a:effectStyle>
-        <a:effectStyle>
-          <a:effectLst>
-            <a:outerShdw blurRad="40000" dist="23000" dir="5400000" rotWithShape="0">
-              <a:srgbClr val="000000">
-                <a:alpha val="35000"/>
-              </a:srgbClr>
-            </a:outerShdw>
-          </a:effectLst>
-        </a:effectStyle>
-        <a:effectStyle>
-          <a:effectLst>
-            <a:outerShdw blurRad="40000" dist="23000" dir="5400000" rotWithShape="0">
-              <a:srgbClr val="000000">
-                <a:alpha val="35000"/>
-              </a:srgbClr>
-            </a:outerShdw>
-          </a:effectLst>
-          <a:scene3d>
-            <a:camera prst="orthographicFront">
-              <a:rot lat="0" lon="0" rev="0"/>
-            </a:camera>
-            <a:lightRig rig="threePt" dir="t">
-              <a:rot lat="0" lon="0" rev="1200000"/>
-            </a:lightRig>
-          </a:scene3d>
-          <a:sp3d>
-            <a:bevelT w="63500" h="25400"/>
-          </a:sp3d>
-        </a:effectStyle>
-      </a:effectStyleLst>
-      <a:bgFillStyleLst>
-        <a:solidFill>
-          <a:schemeClr val="phClr"/>
-        </a:solidFill>
-        <a:gradFill rotWithShape="1">
-          <a:gsLst>
-            <a:gs pos="0">
-              <a:schemeClr val="phClr">
-                <a:tint val="40000"/>
-                <a:satMod val="350000"/>
-              </a:schemeClr>
-            </a:gs>
-            <a:gs pos="40000">
-              <a:schemeClr val="phClr">
-                <a:tint val="45000"/>
-                <a:shade val="99000"/>
-                <a:satMod val="350000"/>
-              </a:schemeClr>
-            </a:gs>
-            <a:gs pos="100000">
-              <a:schemeClr val="phClr">
-                <a:shade val="20000"/>
-                <a:satMod val="255000"/>
-              </a:schemeClr>
-            </a:gs>
-          </a:gsLst>
-          <a:path path="circle">
-            <a:fillToRect l="50000" t="-80000" r="50000" b="180000"/>
-          </a:path>
-        </a:gradFill>
-        <a:gradFill rotWithShape="1">
-          <a:gsLst>
-            <a:gs pos="0">
-              <a:schemeClr val="phClr">
-                <a:tint val="80000"/>
-                <a:satMod val="300000"/>
-              </a:schemeClr>
-            </a:gs>
-            <a:gs pos="100000">
-              <a:schemeClr val="phClr">
-                <a:shade val="30000"/>
-                <a:satMod val="200000"/>
-              </a:schemeClr>
-            </a:gs>
-          </a:gsLst>
-          <a:path path="circle">
-            <a:fillToRect l="50000" t="50000" r="50000" b="50000"/>
-          </a:path>
-        </a:gradFill>
-      </a:bgFillStyleLst>
-    </a:fmtScheme>
-  </a:themeElements>
-</a:theme>
 </file>
</xml_diff>